<commit_message>
docs : fix ppt
</commit_message>
<xml_diff>
--- a/docs/제안서 발표자료.pptx
+++ b/docs/제안서 발표자료.pptx
@@ -5,7 +5,7 @@
     <p:sldMasterId id="2147483648" r:id="rId1"/>
   </p:sldMasterIdLst>
   <p:notesMasterIdLst>
-    <p:notesMasterId r:id="rId11"/>
+    <p:notesMasterId r:id="rId15"/>
   </p:notesMasterIdLst>
   <p:sldIdLst>
     <p:sldId id="256" r:id="rId2"/>
@@ -15,8 +15,12 @@
     <p:sldId id="260" r:id="rId6"/>
     <p:sldId id="261" r:id="rId7"/>
     <p:sldId id="262" r:id="rId8"/>
-    <p:sldId id="263" r:id="rId9"/>
-    <p:sldId id="264" r:id="rId10"/>
+    <p:sldId id="265" r:id="rId9"/>
+    <p:sldId id="266" r:id="rId10"/>
+    <p:sldId id="267" r:id="rId11"/>
+    <p:sldId id="263" r:id="rId12"/>
+    <p:sldId id="264" r:id="rId13"/>
+    <p:sldId id="268" r:id="rId14"/>
   </p:sldIdLst>
   <p:sldSz cx="12192000" cy="6858000"/>
   <p:notesSz cx="6858000" cy="9144000"/>
@@ -115,13 +119,18 @@
       </a:defRPr>
     </a:lvl9pPr>
   </p:defaultTextStyle>
+  <p:extLst>
+    <p:ext uri="{EFAFB233-063F-42B5-8137-9DF3F51BA10A}">
+      <p15:sldGuideLst xmlns:p15="http://schemas.microsoft.com/office/powerpoint/2012/main"/>
+    </p:ext>
+  </p:extLst>
 </p:presentation>
 </file>
 
 <file path=ppt/revisionInfo.xml><?xml version="1.0" encoding="utf-8"?>
 <p1510:revInfo xmlns:a="http://schemas.openxmlformats.org/drawingml/2006/main" xmlns:r="http://schemas.openxmlformats.org/officeDocument/2006/relationships" xmlns:p1510="http://schemas.microsoft.com/office/powerpoint/2015/10/main">
   <p1510:revLst>
-    <p1510:client id="{2BC64ADA-2E29-4331-AD89-7BC66B9A7B0C}" v="47" dt="2023-03-06T13:25:28.435"/>
+    <p1510:client id="{2BC64ADA-2E29-4331-AD89-7BC66B9A7B0C}" v="228" dt="2023-03-07T13:11:35.551"/>
   </p1510:revLst>
 </p1510:revInfo>
 </file>
@@ -130,8 +139,8 @@
 <pc:chgInfo xmlns:a="http://schemas.openxmlformats.org/drawingml/2006/main" xmlns:r="http://schemas.openxmlformats.org/officeDocument/2006/relationships" xmlns:ac="http://schemas.microsoft.com/office/drawing/2013/main/command" xmlns:pc="http://schemas.microsoft.com/office/powerpoint/2013/main/command">
   <pc:docChgLst>
     <pc:chgData name="jaesung" userId="eba24deada9c5843" providerId="LiveId" clId="{2BC64ADA-2E29-4331-AD89-7BC66B9A7B0C}"/>
-    <pc:docChg chg="undo custSel addSld delSld modSld">
-      <pc:chgData name="jaesung" userId="eba24deada9c5843" providerId="LiveId" clId="{2BC64ADA-2E29-4331-AD89-7BC66B9A7B0C}" dt="2023-03-06T13:25:28.435" v="650"/>
+    <pc:docChg chg="undo redo custSel addSld delSld modSld">
+      <pc:chgData name="jaesung" userId="eba24deada9c5843" providerId="LiveId" clId="{2BC64ADA-2E29-4331-AD89-7BC66B9A7B0C}" dt="2023-03-07T13:11:35.550" v="2947"/>
       <pc:docMkLst>
         <pc:docMk/>
       </pc:docMkLst>
@@ -314,8 +323,8 @@
           </ac:cxnSpMkLst>
         </pc:cxnChg>
       </pc:sldChg>
-      <pc:sldChg chg="delSp modSp add mod modNotesTx">
-        <pc:chgData name="jaesung" userId="eba24deada9c5843" providerId="LiveId" clId="{2BC64ADA-2E29-4331-AD89-7BC66B9A7B0C}" dt="2023-03-06T13:24:01.746" v="587" actId="20577"/>
+      <pc:sldChg chg="addSp delSp modSp add mod modNotesTx">
+        <pc:chgData name="jaesung" userId="eba24deada9c5843" providerId="LiveId" clId="{2BC64ADA-2E29-4331-AD89-7BC66B9A7B0C}" dt="2023-03-07T11:08:33.502" v="824" actId="207"/>
         <pc:sldMkLst>
           <pc:docMk/>
           <pc:sldMk cId="1222331614" sldId="260"/>
@@ -328,6 +337,22 @@
             <ac:spMk id="2" creationId="{0423823E-CA6D-0DFA-4403-A7FC715FD5E2}"/>
           </ac:spMkLst>
         </pc:spChg>
+        <pc:spChg chg="add mod">
+          <ac:chgData name="jaesung" userId="eba24deada9c5843" providerId="LiveId" clId="{2BC64ADA-2E29-4331-AD89-7BC66B9A7B0C}" dt="2023-03-07T11:08:14.607" v="822" actId="2711"/>
+          <ac:spMkLst>
+            <pc:docMk/>
+            <pc:sldMk cId="1222331614" sldId="260"/>
+            <ac:spMk id="3" creationId="{02322902-D6CE-121C-6A92-AA34FC663DB2}"/>
+          </ac:spMkLst>
+        </pc:spChg>
+        <pc:spChg chg="add mod">
+          <ac:chgData name="jaesung" userId="eba24deada9c5843" providerId="LiveId" clId="{2BC64ADA-2E29-4331-AD89-7BC66B9A7B0C}" dt="2023-03-07T11:08:33.502" v="824" actId="207"/>
+          <ac:spMkLst>
+            <pc:docMk/>
+            <pc:sldMk cId="1222331614" sldId="260"/>
+            <ac:spMk id="7" creationId="{85023DE6-30CC-FDBD-8FA1-3C6E29F553C2}"/>
+          </ac:spMkLst>
+        </pc:spChg>
         <pc:picChg chg="del">
           <ac:chgData name="jaesung" userId="eba24deada9c5843" providerId="LiveId" clId="{2BC64ADA-2E29-4331-AD89-7BC66B9A7B0C}" dt="2023-03-06T13:21:56.865" v="532" actId="478"/>
           <ac:picMkLst>
@@ -336,15 +361,23 @@
             <ac:picMk id="4" creationId="{63C3AD85-FC05-D566-15DB-9916B771294F}"/>
           </ac:picMkLst>
         </pc:picChg>
+        <pc:cxnChg chg="add mod">
+          <ac:chgData name="jaesung" userId="eba24deada9c5843" providerId="LiveId" clId="{2BC64ADA-2E29-4331-AD89-7BC66B9A7B0C}" dt="2023-03-07T11:07:52.417" v="821" actId="1035"/>
+          <ac:cxnSpMkLst>
+            <pc:docMk/>
+            <pc:sldMk cId="1222331614" sldId="260"/>
+            <ac:cxnSpMk id="5" creationId="{C894D78A-62DE-5C98-6A17-2C0F1B1285EC}"/>
+          </ac:cxnSpMkLst>
+        </pc:cxnChg>
       </pc:sldChg>
       <pc:sldChg chg="delSp modSp add mod modNotesTx">
-        <pc:chgData name="jaesung" userId="eba24deada9c5843" providerId="LiveId" clId="{2BC64ADA-2E29-4331-AD89-7BC66B9A7B0C}" dt="2023-03-06T13:24:04.948" v="589" actId="20577"/>
+        <pc:chgData name="jaesung" userId="eba24deada9c5843" providerId="LiveId" clId="{2BC64ADA-2E29-4331-AD89-7BC66B9A7B0C}" dt="2023-03-07T12:35:00.307" v="1767" actId="207"/>
         <pc:sldMkLst>
           <pc:docMk/>
           <pc:sldMk cId="889909948" sldId="261"/>
         </pc:sldMkLst>
         <pc:spChg chg="mod">
-          <ac:chgData name="jaesung" userId="eba24deada9c5843" providerId="LiveId" clId="{2BC64ADA-2E29-4331-AD89-7BC66B9A7B0C}" dt="2023-03-06T13:23:54.947" v="584"/>
+          <ac:chgData name="jaesung" userId="eba24deada9c5843" providerId="LiveId" clId="{2BC64ADA-2E29-4331-AD89-7BC66B9A7B0C}" dt="2023-03-07T12:35:00.307" v="1767" actId="207"/>
           <ac:spMkLst>
             <pc:docMk/>
             <pc:sldMk cId="889909948" sldId="261"/>
@@ -360,8 +393,8 @@
           </ac:picMkLst>
         </pc:picChg>
       </pc:sldChg>
-      <pc:sldChg chg="delSp modSp add mod modNotesTx">
-        <pc:chgData name="jaesung" userId="eba24deada9c5843" providerId="LiveId" clId="{2BC64ADA-2E29-4331-AD89-7BC66B9A7B0C}" dt="2023-03-06T13:24:22.721" v="610"/>
+      <pc:sldChg chg="addSp delSp modSp add mod delAnim modAnim modNotesTx">
+        <pc:chgData name="jaesung" userId="eba24deada9c5843" providerId="LiveId" clId="{2BC64ADA-2E29-4331-AD89-7BC66B9A7B0C}" dt="2023-03-07T11:36:29.964" v="1464" actId="2711"/>
         <pc:sldMkLst>
           <pc:docMk/>
           <pc:sldMk cId="2138615794" sldId="262"/>
@@ -374,6 +407,86 @@
             <ac:spMk id="2" creationId="{0423823E-CA6D-0DFA-4403-A7FC715FD5E2}"/>
           </ac:spMkLst>
         </pc:spChg>
+        <pc:spChg chg="add del mod">
+          <ac:chgData name="jaesung" userId="eba24deada9c5843" providerId="LiveId" clId="{2BC64ADA-2E29-4331-AD89-7BC66B9A7B0C}" dt="2023-03-07T11:32:59.542" v="1397" actId="478"/>
+          <ac:spMkLst>
+            <pc:docMk/>
+            <pc:sldMk cId="2138615794" sldId="262"/>
+            <ac:spMk id="3" creationId="{53A93B22-ED66-662B-A74B-0A5D26889063}"/>
+          </ac:spMkLst>
+        </pc:spChg>
+        <pc:spChg chg="add del">
+          <ac:chgData name="jaesung" userId="eba24deada9c5843" providerId="LiveId" clId="{2BC64ADA-2E29-4331-AD89-7BC66B9A7B0C}" dt="2023-03-07T11:30:36.766" v="1087" actId="478"/>
+          <ac:spMkLst>
+            <pc:docMk/>
+            <pc:sldMk cId="2138615794" sldId="262"/>
+            <ac:spMk id="4" creationId="{B86E186D-28D1-BA44-4DB3-36DC96694132}"/>
+          </ac:spMkLst>
+        </pc:spChg>
+        <pc:spChg chg="add del mod">
+          <ac:chgData name="jaesung" userId="eba24deada9c5843" providerId="LiveId" clId="{2BC64ADA-2E29-4331-AD89-7BC66B9A7B0C}" dt="2023-03-07T11:30:55.919" v="1147" actId="478"/>
+          <ac:spMkLst>
+            <pc:docMk/>
+            <pc:sldMk cId="2138615794" sldId="262"/>
+            <ac:spMk id="5" creationId="{A30322A2-7269-1819-0D19-D7B9A8C246A2}"/>
+          </ac:spMkLst>
+        </pc:spChg>
+        <pc:spChg chg="add mod">
+          <ac:chgData name="jaesung" userId="eba24deada9c5843" providerId="LiveId" clId="{2BC64ADA-2E29-4331-AD89-7BC66B9A7B0C}" dt="2023-03-07T11:36:15.472" v="1462" actId="2711"/>
+          <ac:spMkLst>
+            <pc:docMk/>
+            <pc:sldMk cId="2138615794" sldId="262"/>
+            <ac:spMk id="6" creationId="{AE9A62FD-71BD-5056-6552-99A718A97C98}"/>
+          </ac:spMkLst>
+        </pc:spChg>
+        <pc:spChg chg="add del mod">
+          <ac:chgData name="jaesung" userId="eba24deada9c5843" providerId="LiveId" clId="{2BC64ADA-2E29-4331-AD89-7BC66B9A7B0C}" dt="2023-03-07T11:35:26.611" v="1448" actId="478"/>
+          <ac:spMkLst>
+            <pc:docMk/>
+            <pc:sldMk cId="2138615794" sldId="262"/>
+            <ac:spMk id="7" creationId="{235ECD1B-1E58-129A-C6C9-9C4CDE62BEF2}"/>
+          </ac:spMkLst>
+        </pc:spChg>
+        <pc:spChg chg="add mod">
+          <ac:chgData name="jaesung" userId="eba24deada9c5843" providerId="LiveId" clId="{2BC64ADA-2E29-4331-AD89-7BC66B9A7B0C}" dt="2023-03-07T11:36:21.993" v="1463" actId="2711"/>
+          <ac:spMkLst>
+            <pc:docMk/>
+            <pc:sldMk cId="2138615794" sldId="262"/>
+            <ac:spMk id="8" creationId="{8D94C876-3D24-9A41-5BD4-52B1DE5EB146}"/>
+          </ac:spMkLst>
+        </pc:spChg>
+        <pc:spChg chg="add del mod">
+          <ac:chgData name="jaesung" userId="eba24deada9c5843" providerId="LiveId" clId="{2BC64ADA-2E29-4331-AD89-7BC66B9A7B0C}" dt="2023-03-07T11:35:49.632" v="1453" actId="478"/>
+          <ac:spMkLst>
+            <pc:docMk/>
+            <pc:sldMk cId="2138615794" sldId="262"/>
+            <ac:spMk id="9" creationId="{0F4E456F-E289-FFBF-37A7-FECBA38B9BBA}"/>
+          </ac:spMkLst>
+        </pc:spChg>
+        <pc:spChg chg="add mod">
+          <ac:chgData name="jaesung" userId="eba24deada9c5843" providerId="LiveId" clId="{2BC64ADA-2E29-4331-AD89-7BC66B9A7B0C}" dt="2023-03-07T11:36:29.964" v="1464" actId="2711"/>
+          <ac:spMkLst>
+            <pc:docMk/>
+            <pc:sldMk cId="2138615794" sldId="262"/>
+            <ac:spMk id="10" creationId="{F9962305-EB59-C6F4-0B72-A6C60BE21EFB}"/>
+          </ac:spMkLst>
+        </pc:spChg>
+        <pc:spChg chg="add del mod">
+          <ac:chgData name="jaesung" userId="eba24deada9c5843" providerId="LiveId" clId="{2BC64ADA-2E29-4331-AD89-7BC66B9A7B0C}" dt="2023-03-07T11:36:00.141" v="1458" actId="478"/>
+          <ac:spMkLst>
+            <pc:docMk/>
+            <pc:sldMk cId="2138615794" sldId="262"/>
+            <ac:spMk id="11" creationId="{BBB5CDB6-0AB9-125B-DE68-ED3DECDE5AD3}"/>
+          </ac:spMkLst>
+        </pc:spChg>
+        <pc:spChg chg="add mod">
+          <ac:chgData name="jaesung" userId="eba24deada9c5843" providerId="LiveId" clId="{2BC64ADA-2E29-4331-AD89-7BC66B9A7B0C}" dt="2023-03-07T11:35:22.760" v="1446"/>
+          <ac:spMkLst>
+            <pc:docMk/>
+            <pc:sldMk cId="2138615794" sldId="262"/>
+            <ac:spMk id="13" creationId="{D0DE3768-61FC-3B2B-F785-3DC276B9B38E}"/>
+          </ac:spMkLst>
+        </pc:spChg>
         <pc:picChg chg="del">
           <ac:chgData name="jaesung" userId="eba24deada9c5843" providerId="LiveId" clId="{2BC64ADA-2E29-4331-AD89-7BC66B9A7B0C}" dt="2023-03-06T13:23:57.375" v="586" actId="478"/>
           <ac:picMkLst>
@@ -382,24 +495,40 @@
             <ac:picMk id="4" creationId="{63C3AD85-FC05-D566-15DB-9916B771294F}"/>
           </ac:picMkLst>
         </pc:picChg>
+        <pc:picChg chg="add del mod">
+          <ac:chgData name="jaesung" userId="eba24deada9c5843" providerId="LiveId" clId="{2BC64ADA-2E29-4331-AD89-7BC66B9A7B0C}" dt="2023-03-07T11:35:13.331" v="1435" actId="478"/>
+          <ac:picMkLst>
+            <pc:docMk/>
+            <pc:sldMk cId="2138615794" sldId="262"/>
+            <ac:picMk id="12" creationId="{2239DE73-0DCB-3876-B1B9-FDF3F3DB2445}"/>
+          </ac:picMkLst>
+        </pc:picChg>
       </pc:sldChg>
-      <pc:sldChg chg="modSp add mod">
-        <pc:chgData name="jaesung" userId="eba24deada9c5843" providerId="LiveId" clId="{2BC64ADA-2E29-4331-AD89-7BC66B9A7B0C}" dt="2023-03-06T13:25:17.208" v="624"/>
+      <pc:sldChg chg="addSp modSp add mod">
+        <pc:chgData name="jaesung" userId="eba24deada9c5843" providerId="LiveId" clId="{2BC64ADA-2E29-4331-AD89-7BC66B9A7B0C}" dt="2023-03-07T13:11:21.781" v="2942" actId="255"/>
         <pc:sldMkLst>
           <pc:docMk/>
           <pc:sldMk cId="4248988520" sldId="263"/>
         </pc:sldMkLst>
         <pc:spChg chg="mod">
-          <ac:chgData name="jaesung" userId="eba24deada9c5843" providerId="LiveId" clId="{2BC64ADA-2E29-4331-AD89-7BC66B9A7B0C}" dt="2023-03-06T13:25:17.208" v="624"/>
+          <ac:chgData name="jaesung" userId="eba24deada9c5843" providerId="LiveId" clId="{2BC64ADA-2E29-4331-AD89-7BC66B9A7B0C}" dt="2023-03-07T12:45:37.845" v="2719" actId="1076"/>
           <ac:spMkLst>
             <pc:docMk/>
             <pc:sldMk cId="4248988520" sldId="263"/>
             <ac:spMk id="2" creationId="{0423823E-CA6D-0DFA-4403-A7FC715FD5E2}"/>
           </ac:spMkLst>
         </pc:spChg>
+        <pc:graphicFrameChg chg="add mod modGraphic">
+          <ac:chgData name="jaesung" userId="eba24deada9c5843" providerId="LiveId" clId="{2BC64ADA-2E29-4331-AD89-7BC66B9A7B0C}" dt="2023-03-07T13:11:21.781" v="2942" actId="255"/>
+          <ac:graphicFrameMkLst>
+            <pc:docMk/>
+            <pc:sldMk cId="4248988520" sldId="263"/>
+            <ac:graphicFrameMk id="3" creationId="{AE2BF95F-E8AD-1971-CA74-3944326E59D1}"/>
+          </ac:graphicFrameMkLst>
+        </pc:graphicFrameChg>
       </pc:sldChg>
-      <pc:sldChg chg="modSp add mod">
-        <pc:chgData name="jaesung" userId="eba24deada9c5843" providerId="LiveId" clId="{2BC64ADA-2E29-4331-AD89-7BC66B9A7B0C}" dt="2023-03-06T13:25:28.435" v="650"/>
+      <pc:sldChg chg="addSp modSp add mod">
+        <pc:chgData name="jaesung" userId="eba24deada9c5843" providerId="LiveId" clId="{2BC64ADA-2E29-4331-AD89-7BC66B9A7B0C}" dt="2023-03-07T13:08:31.761" v="2901"/>
         <pc:sldMkLst>
           <pc:docMk/>
           <pc:sldMk cId="3800118700" sldId="264"/>
@@ -410,6 +539,242 @@
             <pc:docMk/>
             <pc:sldMk cId="3800118700" sldId="264"/>
             <ac:spMk id="2" creationId="{0423823E-CA6D-0DFA-4403-A7FC715FD5E2}"/>
+          </ac:spMkLst>
+        </pc:spChg>
+        <pc:spChg chg="add mod">
+          <ac:chgData name="jaesung" userId="eba24deada9c5843" providerId="LiveId" clId="{2BC64ADA-2E29-4331-AD89-7BC66B9A7B0C}" dt="2023-03-07T13:08:31.761" v="2901"/>
+          <ac:spMkLst>
+            <pc:docMk/>
+            <pc:sldMk cId="3800118700" sldId="264"/>
+            <ac:spMk id="3" creationId="{7EFC95EE-4BFD-6470-D2ED-CD234BFA812C}"/>
+          </ac:spMkLst>
+        </pc:spChg>
+      </pc:sldChg>
+      <pc:sldChg chg="addSp delSp modSp add mod">
+        <pc:chgData name="jaesung" userId="eba24deada9c5843" providerId="LiveId" clId="{2BC64ADA-2E29-4331-AD89-7BC66B9A7B0C}" dt="2023-03-07T12:35:13.267" v="1769" actId="207"/>
+        <pc:sldMkLst>
+          <pc:docMk/>
+          <pc:sldMk cId="101114485" sldId="265"/>
+        </pc:sldMkLst>
+        <pc:spChg chg="mod">
+          <ac:chgData name="jaesung" userId="eba24deada9c5843" providerId="LiveId" clId="{2BC64ADA-2E29-4331-AD89-7BC66B9A7B0C}" dt="2023-03-07T12:35:13.267" v="1769" actId="207"/>
+          <ac:spMkLst>
+            <pc:docMk/>
+            <pc:sldMk cId="101114485" sldId="265"/>
+            <ac:spMk id="2" creationId="{0423823E-CA6D-0DFA-4403-A7FC715FD5E2}"/>
+          </ac:spMkLst>
+        </pc:spChg>
+        <pc:spChg chg="del">
+          <ac:chgData name="jaesung" userId="eba24deada9c5843" providerId="LiveId" clId="{2BC64ADA-2E29-4331-AD89-7BC66B9A7B0C}" dt="2023-03-07T11:36:48.968" v="1467" actId="478"/>
+          <ac:spMkLst>
+            <pc:docMk/>
+            <pc:sldMk cId="101114485" sldId="265"/>
+            <ac:spMk id="6" creationId="{AE9A62FD-71BD-5056-6552-99A718A97C98}"/>
+          </ac:spMkLst>
+        </pc:spChg>
+        <pc:spChg chg="del">
+          <ac:chgData name="jaesung" userId="eba24deada9c5843" providerId="LiveId" clId="{2BC64ADA-2E29-4331-AD89-7BC66B9A7B0C}" dt="2023-03-07T11:36:49.684" v="1468" actId="478"/>
+          <ac:spMkLst>
+            <pc:docMk/>
+            <pc:sldMk cId="101114485" sldId="265"/>
+            <ac:spMk id="8" creationId="{8D94C876-3D24-9A41-5BD4-52B1DE5EB146}"/>
+          </ac:spMkLst>
+        </pc:spChg>
+        <pc:spChg chg="del">
+          <ac:chgData name="jaesung" userId="eba24deada9c5843" providerId="LiveId" clId="{2BC64ADA-2E29-4331-AD89-7BC66B9A7B0C}" dt="2023-03-07T11:36:50.248" v="1469" actId="478"/>
+          <ac:spMkLst>
+            <pc:docMk/>
+            <pc:sldMk cId="101114485" sldId="265"/>
+            <ac:spMk id="10" creationId="{F9962305-EB59-C6F4-0B72-A6C60BE21EFB}"/>
+          </ac:spMkLst>
+        </pc:spChg>
+        <pc:spChg chg="del">
+          <ac:chgData name="jaesung" userId="eba24deada9c5843" providerId="LiveId" clId="{2BC64ADA-2E29-4331-AD89-7BC66B9A7B0C}" dt="2023-03-07T11:36:47.308" v="1466" actId="478"/>
+          <ac:spMkLst>
+            <pc:docMk/>
+            <pc:sldMk cId="101114485" sldId="265"/>
+            <ac:spMk id="13" creationId="{D0DE3768-61FC-3B2B-F785-3DC276B9B38E}"/>
+          </ac:spMkLst>
+        </pc:spChg>
+        <pc:picChg chg="add del mod">
+          <ac:chgData name="jaesung" userId="eba24deada9c5843" providerId="LiveId" clId="{2BC64ADA-2E29-4331-AD89-7BC66B9A7B0C}" dt="2023-03-07T11:44:48.584" v="1496" actId="478"/>
+          <ac:picMkLst>
+            <pc:docMk/>
+            <pc:sldMk cId="101114485" sldId="265"/>
+            <ac:picMk id="3" creationId="{1ECE6C5E-11B4-0478-1B50-A305090EF690}"/>
+          </ac:picMkLst>
+        </pc:picChg>
+        <pc:picChg chg="add mod">
+          <ac:chgData name="jaesung" userId="eba24deada9c5843" providerId="LiveId" clId="{2BC64ADA-2E29-4331-AD89-7BC66B9A7B0C}" dt="2023-03-07T11:45:01.063" v="1499" actId="1076"/>
+          <ac:picMkLst>
+            <pc:docMk/>
+            <pc:sldMk cId="101114485" sldId="265"/>
+            <ac:picMk id="4" creationId="{0FBD1C01-D534-F534-25C4-899E8F466E08}"/>
+          </ac:picMkLst>
+        </pc:picChg>
+      </pc:sldChg>
+      <pc:sldChg chg="modSp add mod">
+        <pc:chgData name="jaesung" userId="eba24deada9c5843" providerId="LiveId" clId="{2BC64ADA-2E29-4331-AD89-7BC66B9A7B0C}" dt="2023-03-07T12:20:47.840" v="1668" actId="1037"/>
+        <pc:sldMkLst>
+          <pc:docMk/>
+          <pc:sldMk cId="3415972706" sldId="266"/>
+        </pc:sldMkLst>
+        <pc:picChg chg="mod">
+          <ac:chgData name="jaesung" userId="eba24deada9c5843" providerId="LiveId" clId="{2BC64ADA-2E29-4331-AD89-7BC66B9A7B0C}" dt="2023-03-07T12:20:47.840" v="1668" actId="1037"/>
+          <ac:picMkLst>
+            <pc:docMk/>
+            <pc:sldMk cId="3415972706" sldId="266"/>
+            <ac:picMk id="3" creationId="{1ECE6C5E-11B4-0478-1B50-A305090EF690}"/>
+          </ac:picMkLst>
+        </pc:picChg>
+      </pc:sldChg>
+      <pc:sldChg chg="addSp delSp modSp add mod setBg setClrOvrMap">
+        <pc:chgData name="jaesung" userId="eba24deada9c5843" providerId="LiveId" clId="{2BC64ADA-2E29-4331-AD89-7BC66B9A7B0C}" dt="2023-03-07T12:35:29.728" v="1771" actId="207"/>
+        <pc:sldMkLst>
+          <pc:docMk/>
+          <pc:sldMk cId="3857249578" sldId="267"/>
+        </pc:sldMkLst>
+        <pc:spChg chg="mod ord">
+          <ac:chgData name="jaesung" userId="eba24deada9c5843" providerId="LiveId" clId="{2BC64ADA-2E29-4331-AD89-7BC66B9A7B0C}" dt="2023-03-07T12:35:29.728" v="1771" actId="207"/>
+          <ac:spMkLst>
+            <pc:docMk/>
+            <pc:sldMk cId="3857249578" sldId="267"/>
+            <ac:spMk id="2" creationId="{0423823E-CA6D-0DFA-4403-A7FC715FD5E2}"/>
+          </ac:spMkLst>
+        </pc:spChg>
+        <pc:spChg chg="add del">
+          <ac:chgData name="jaesung" userId="eba24deada9c5843" providerId="LiveId" clId="{2BC64ADA-2E29-4331-AD89-7BC66B9A7B0C}" dt="2023-03-07T12:00:04.323" v="1521" actId="478"/>
+          <ac:spMkLst>
+            <pc:docMk/>
+            <pc:sldMk cId="3857249578" sldId="267"/>
+            <ac:spMk id="6" creationId="{C8C4E682-6EDE-86FF-0405-2447C36B6B51}"/>
+          </ac:spMkLst>
+        </pc:spChg>
+        <pc:spChg chg="add mod">
+          <ac:chgData name="jaesung" userId="eba24deada9c5843" providerId="LiveId" clId="{2BC64ADA-2E29-4331-AD89-7BC66B9A7B0C}" dt="2023-03-07T12:19:47.671" v="1654" actId="1076"/>
+          <ac:spMkLst>
+            <pc:docMk/>
+            <pc:sldMk cId="3857249578" sldId="267"/>
+            <ac:spMk id="9" creationId="{9773BC77-9DBD-7E3E-D5AE-8774680C00FD}"/>
+          </ac:spMkLst>
+        </pc:spChg>
+        <pc:spChg chg="add del">
+          <ac:chgData name="jaesung" userId="eba24deada9c5843" providerId="LiveId" clId="{2BC64ADA-2E29-4331-AD89-7BC66B9A7B0C}" dt="2023-03-07T11:56:53.549" v="1517" actId="26606"/>
+          <ac:spMkLst>
+            <pc:docMk/>
+            <pc:sldMk cId="3857249578" sldId="267"/>
+            <ac:spMk id="10" creationId="{71B2258F-86CA-4D4D-8270-BC05FCDEBFB3}"/>
+          </ac:spMkLst>
+        </pc:spChg>
+        <pc:spChg chg="add mod">
+          <ac:chgData name="jaesung" userId="eba24deada9c5843" providerId="LiveId" clId="{2BC64ADA-2E29-4331-AD89-7BC66B9A7B0C}" dt="2023-03-07T12:19:47.671" v="1654" actId="1076"/>
+          <ac:spMkLst>
+            <pc:docMk/>
+            <pc:sldMk cId="3857249578" sldId="267"/>
+            <ac:spMk id="12" creationId="{3F7B1382-DD51-8235-4FEB-D379D0989307}"/>
+          </ac:spMkLst>
+        </pc:spChg>
+        <pc:spChg chg="add mod">
+          <ac:chgData name="jaesung" userId="eba24deada9c5843" providerId="LiveId" clId="{2BC64ADA-2E29-4331-AD89-7BC66B9A7B0C}" dt="2023-03-07T12:33:58.002" v="1764" actId="20577"/>
+          <ac:spMkLst>
+            <pc:docMk/>
+            <pc:sldMk cId="3857249578" sldId="267"/>
+            <ac:spMk id="14" creationId="{5D8B7ACB-8F3B-C8B1-0211-AD5E01FD349A}"/>
+          </ac:spMkLst>
+        </pc:spChg>
+        <pc:spChg chg="add mod">
+          <ac:chgData name="jaesung" userId="eba24deada9c5843" providerId="LiveId" clId="{2BC64ADA-2E29-4331-AD89-7BC66B9A7B0C}" dt="2023-03-07T12:32:44.499" v="1748" actId="255"/>
+          <ac:spMkLst>
+            <pc:docMk/>
+            <pc:sldMk cId="3857249578" sldId="267"/>
+            <ac:spMk id="17" creationId="{DD2D0035-986D-639A-71EF-CE8FB183BB29}"/>
+          </ac:spMkLst>
+        </pc:spChg>
+        <pc:spChg chg="add del mod">
+          <ac:chgData name="jaesung" userId="eba24deada9c5843" providerId="LiveId" clId="{2BC64ADA-2E29-4331-AD89-7BC66B9A7B0C}" dt="2023-03-07T12:24:08.294" v="1699" actId="478"/>
+          <ac:spMkLst>
+            <pc:docMk/>
+            <pc:sldMk cId="3857249578" sldId="267"/>
+            <ac:spMk id="18" creationId="{C7613210-AC4D-EFA6-8E06-185B672F7F30}"/>
+          </ac:spMkLst>
+        </pc:spChg>
+        <pc:spChg chg="add mod">
+          <ac:chgData name="jaesung" userId="eba24deada9c5843" providerId="LiveId" clId="{2BC64ADA-2E29-4331-AD89-7BC66B9A7B0C}" dt="2023-03-07T12:27:17.741" v="1722" actId="1076"/>
+          <ac:spMkLst>
+            <pc:docMk/>
+            <pc:sldMk cId="3857249578" sldId="267"/>
+            <ac:spMk id="19" creationId="{BEB45CD6-FAE6-1FB0-4D6B-DA356F7DADB9}"/>
+          </ac:spMkLst>
+        </pc:spChg>
+        <pc:picChg chg="del">
+          <ac:chgData name="jaesung" userId="eba24deada9c5843" providerId="LiveId" clId="{2BC64ADA-2E29-4331-AD89-7BC66B9A7B0C}" dt="2023-03-07T11:56:24.195" v="1510" actId="478"/>
+          <ac:picMkLst>
+            <pc:docMk/>
+            <pc:sldMk cId="3857249578" sldId="267"/>
+            <ac:picMk id="3" creationId="{1ECE6C5E-11B4-0478-1B50-A305090EF690}"/>
+          </ac:picMkLst>
+        </pc:picChg>
+        <pc:picChg chg="add mod">
+          <ac:chgData name="jaesung" userId="eba24deada9c5843" providerId="LiveId" clId="{2BC64ADA-2E29-4331-AD89-7BC66B9A7B0C}" dt="2023-03-07T11:59:58.774" v="1519" actId="1076"/>
+          <ac:picMkLst>
+            <pc:docMk/>
+            <pc:sldMk cId="3857249578" sldId="267"/>
+            <ac:picMk id="5" creationId="{B73213FD-647B-9C5A-4FCC-E5CDC4EBEFA6}"/>
+          </ac:picMkLst>
+        </pc:picChg>
+        <pc:cxnChg chg="add mod">
+          <ac:chgData name="jaesung" userId="eba24deada9c5843" providerId="LiveId" clId="{2BC64ADA-2E29-4331-AD89-7BC66B9A7B0C}" dt="2023-03-07T12:19:47.671" v="1654" actId="1076"/>
+          <ac:cxnSpMkLst>
+            <pc:docMk/>
+            <pc:sldMk cId="3857249578" sldId="267"/>
+            <ac:cxnSpMk id="8" creationId="{033313D3-38E8-62A4-AD82-5368DFC7C8A9}"/>
+          </ac:cxnSpMkLst>
+        </pc:cxnChg>
+        <pc:cxnChg chg="add mod">
+          <ac:chgData name="jaesung" userId="eba24deada9c5843" providerId="LiveId" clId="{2BC64ADA-2E29-4331-AD89-7BC66B9A7B0C}" dt="2023-03-07T12:19:47.671" v="1654" actId="1076"/>
+          <ac:cxnSpMkLst>
+            <pc:docMk/>
+            <pc:sldMk cId="3857249578" sldId="267"/>
+            <ac:cxnSpMk id="11" creationId="{971AF966-E00E-11FC-3B77-960D076916E7}"/>
+          </ac:cxnSpMkLst>
+        </pc:cxnChg>
+        <pc:cxnChg chg="add mod">
+          <ac:chgData name="jaesung" userId="eba24deada9c5843" providerId="LiveId" clId="{2BC64ADA-2E29-4331-AD89-7BC66B9A7B0C}" dt="2023-03-07T12:20:01.427" v="1657" actId="1076"/>
+          <ac:cxnSpMkLst>
+            <pc:docMk/>
+            <pc:sldMk cId="3857249578" sldId="267"/>
+            <ac:cxnSpMk id="13" creationId="{7D708F1A-D97D-651D-721D-58C61E835904}"/>
+          </ac:cxnSpMkLst>
+        </pc:cxnChg>
+        <pc:cxnChg chg="add mod">
+          <ac:chgData name="jaesung" userId="eba24deada9c5843" providerId="LiveId" clId="{2BC64ADA-2E29-4331-AD89-7BC66B9A7B0C}" dt="2023-03-07T12:20:01.427" v="1657" actId="1076"/>
+          <ac:cxnSpMkLst>
+            <pc:docMk/>
+            <pc:sldMk cId="3857249578" sldId="267"/>
+            <ac:cxnSpMk id="16" creationId="{10CE8AFE-E135-62C5-DD42-E048CB45694E}"/>
+          </ac:cxnSpMkLst>
+        </pc:cxnChg>
+      </pc:sldChg>
+      <pc:sldChg chg="delSp modSp add mod">
+        <pc:chgData name="jaesung" userId="eba24deada9c5843" providerId="LiveId" clId="{2BC64ADA-2E29-4331-AD89-7BC66B9A7B0C}" dt="2023-03-07T13:11:35.550" v="2947"/>
+        <pc:sldMkLst>
+          <pc:docMk/>
+          <pc:sldMk cId="1361816530" sldId="268"/>
+        </pc:sldMkLst>
+        <pc:spChg chg="mod">
+          <ac:chgData name="jaesung" userId="eba24deada9c5843" providerId="LiveId" clId="{2BC64ADA-2E29-4331-AD89-7BC66B9A7B0C}" dt="2023-03-07T13:11:35.550" v="2947"/>
+          <ac:spMkLst>
+            <pc:docMk/>
+            <pc:sldMk cId="1361816530" sldId="268"/>
+            <ac:spMk id="2" creationId="{0423823E-CA6D-0DFA-4403-A7FC715FD5E2}"/>
+          </ac:spMkLst>
+        </pc:spChg>
+        <pc:spChg chg="del mod">
+          <ac:chgData name="jaesung" userId="eba24deada9c5843" providerId="LiveId" clId="{2BC64ADA-2E29-4331-AD89-7BC66B9A7B0C}" dt="2023-03-07T13:09:02.003" v="2941" actId="478"/>
+          <ac:spMkLst>
+            <pc:docMk/>
+            <pc:sldMk cId="1361816530" sldId="268"/>
+            <ac:spMk id="3" creationId="{7EFC95EE-4BFD-6470-D2ED-CD234BFA812C}"/>
           </ac:spMkLst>
         </pc:spChg>
       </pc:sldChg>
@@ -500,7 +865,7 @@
           <a:p>
             <a:fld id="{7A0D5F4B-5A37-44DD-9F2E-6BB94F1F50F9}" type="datetimeFigureOut">
               <a:rPr lang="ko-KR" altLang="en-US" smtClean="0"/>
-              <a:t>2023-03-06</a:t>
+              <a:t>2023-03-07</a:t>
             </a:fld>
             <a:endParaRPr lang="ko-KR" altLang="en-US"/>
           </a:p>
@@ -867,6 +1232,174 @@
 </p:notes>
 </file>
 
+<file path=ppt/notesSlides/notesSlide10.xml><?xml version="1.0" encoding="utf-8"?>
+<p:notes xmlns:a="http://schemas.openxmlformats.org/drawingml/2006/main" xmlns:r="http://schemas.openxmlformats.org/officeDocument/2006/relationships" xmlns:p="http://schemas.openxmlformats.org/presentationml/2006/main">
+  <p:cSld>
+    <p:spTree>
+      <p:nvGrpSpPr>
+        <p:cNvPr id="1" name=""/>
+        <p:cNvGrpSpPr/>
+        <p:nvPr/>
+      </p:nvGrpSpPr>
+      <p:grpSpPr>
+        <a:xfrm>
+          <a:off x="0" y="0"/>
+          <a:ext cx="0" cy="0"/>
+          <a:chOff x="0" y="0"/>
+          <a:chExt cx="0" cy="0"/>
+        </a:xfrm>
+      </p:grpSpPr>
+      <p:sp>
+        <p:nvSpPr>
+          <p:cNvPr id="2" name="슬라이드 이미지 개체 틀 1"/>
+          <p:cNvSpPr>
+            <a:spLocks noGrp="1" noRot="1" noChangeAspect="1"/>
+          </p:cNvSpPr>
+          <p:nvPr>
+            <p:ph type="sldImg"/>
+          </p:nvPr>
+        </p:nvSpPr>
+        <p:spPr/>
+      </p:sp>
+      <p:sp>
+        <p:nvSpPr>
+          <p:cNvPr id="3" name="슬라이드 노트 개체 틀 2"/>
+          <p:cNvSpPr>
+            <a:spLocks noGrp="1"/>
+          </p:cNvSpPr>
+          <p:nvPr>
+            <p:ph type="body" idx="1"/>
+          </p:nvPr>
+        </p:nvSpPr>
+        <p:spPr/>
+        <p:txBody>
+          <a:bodyPr/>
+          <a:lstStyle/>
+          <a:p>
+            <a:endParaRPr lang="ko-KR" altLang="en-US" dirty="0"/>
+          </a:p>
+        </p:txBody>
+      </p:sp>
+      <p:sp>
+        <p:nvSpPr>
+          <p:cNvPr id="4" name="슬라이드 번호 개체 틀 3"/>
+          <p:cNvSpPr>
+            <a:spLocks noGrp="1"/>
+          </p:cNvSpPr>
+          <p:nvPr>
+            <p:ph type="sldNum" sz="quarter" idx="5"/>
+          </p:nvPr>
+        </p:nvSpPr>
+        <p:spPr/>
+        <p:txBody>
+          <a:bodyPr/>
+          <a:lstStyle/>
+          <a:p>
+            <a:fld id="{6A098155-7AD0-496F-B1D1-934BA0926C43}" type="slidenum">
+              <a:rPr lang="ko-KR" altLang="en-US" smtClean="0"/>
+              <a:t>12</a:t>
+            </a:fld>
+            <a:endParaRPr lang="ko-KR" altLang="en-US"/>
+          </a:p>
+        </p:txBody>
+      </p:sp>
+    </p:spTree>
+    <p:extLst>
+      <p:ext uri="{BB962C8B-B14F-4D97-AF65-F5344CB8AC3E}">
+        <p14:creationId xmlns:p14="http://schemas.microsoft.com/office/powerpoint/2010/main" val="2544866760"/>
+      </p:ext>
+    </p:extLst>
+  </p:cSld>
+  <p:clrMapOvr>
+    <a:masterClrMapping/>
+  </p:clrMapOvr>
+</p:notes>
+</file>
+
+<file path=ppt/notesSlides/notesSlide11.xml><?xml version="1.0" encoding="utf-8"?>
+<p:notes xmlns:a="http://schemas.openxmlformats.org/drawingml/2006/main" xmlns:r="http://schemas.openxmlformats.org/officeDocument/2006/relationships" xmlns:p="http://schemas.openxmlformats.org/presentationml/2006/main">
+  <p:cSld>
+    <p:spTree>
+      <p:nvGrpSpPr>
+        <p:cNvPr id="1" name=""/>
+        <p:cNvGrpSpPr/>
+        <p:nvPr/>
+      </p:nvGrpSpPr>
+      <p:grpSpPr>
+        <a:xfrm>
+          <a:off x="0" y="0"/>
+          <a:ext cx="0" cy="0"/>
+          <a:chOff x="0" y="0"/>
+          <a:chExt cx="0" cy="0"/>
+        </a:xfrm>
+      </p:grpSpPr>
+      <p:sp>
+        <p:nvSpPr>
+          <p:cNvPr id="2" name="슬라이드 이미지 개체 틀 1"/>
+          <p:cNvSpPr>
+            <a:spLocks noGrp="1" noRot="1" noChangeAspect="1"/>
+          </p:cNvSpPr>
+          <p:nvPr>
+            <p:ph type="sldImg"/>
+          </p:nvPr>
+        </p:nvSpPr>
+        <p:spPr/>
+      </p:sp>
+      <p:sp>
+        <p:nvSpPr>
+          <p:cNvPr id="3" name="슬라이드 노트 개체 틀 2"/>
+          <p:cNvSpPr>
+            <a:spLocks noGrp="1"/>
+          </p:cNvSpPr>
+          <p:nvPr>
+            <p:ph type="body" idx="1"/>
+          </p:nvPr>
+        </p:nvSpPr>
+        <p:spPr/>
+        <p:txBody>
+          <a:bodyPr/>
+          <a:lstStyle/>
+          <a:p>
+            <a:endParaRPr lang="ko-KR" altLang="en-US" dirty="0"/>
+          </a:p>
+        </p:txBody>
+      </p:sp>
+      <p:sp>
+        <p:nvSpPr>
+          <p:cNvPr id="4" name="슬라이드 번호 개체 틀 3"/>
+          <p:cNvSpPr>
+            <a:spLocks noGrp="1"/>
+          </p:cNvSpPr>
+          <p:nvPr>
+            <p:ph type="sldNum" sz="quarter" idx="5"/>
+          </p:nvPr>
+        </p:nvSpPr>
+        <p:spPr/>
+        <p:txBody>
+          <a:bodyPr/>
+          <a:lstStyle/>
+          <a:p>
+            <a:fld id="{6A098155-7AD0-496F-B1D1-934BA0926C43}" type="slidenum">
+              <a:rPr lang="ko-KR" altLang="en-US" smtClean="0"/>
+              <a:t>13</a:t>
+            </a:fld>
+            <a:endParaRPr lang="ko-KR" altLang="en-US"/>
+          </a:p>
+        </p:txBody>
+      </p:sp>
+    </p:spTree>
+    <p:extLst>
+      <p:ext uri="{BB962C8B-B14F-4D97-AF65-F5344CB8AC3E}">
+        <p14:creationId xmlns:p14="http://schemas.microsoft.com/office/powerpoint/2010/main" val="3673849895"/>
+      </p:ext>
+    </p:extLst>
+  </p:cSld>
+  <p:clrMapOvr>
+    <a:masterClrMapping/>
+  </p:clrMapOvr>
+</p:notes>
+</file>
+
 <file path=ppt/notesSlides/notesSlide2.xml><?xml version="1.0" encoding="utf-8"?>
 <p:notes xmlns:a="http://schemas.openxmlformats.org/drawingml/2006/main" xmlns:r="http://schemas.openxmlformats.org/officeDocument/2006/relationships" xmlns:p="http://schemas.openxmlformats.org/presentationml/2006/main">
   <p:cSld>
@@ -1281,7 +1814,7 @@
     </p:spTree>
     <p:extLst>
       <p:ext uri="{BB962C8B-B14F-4D97-AF65-F5344CB8AC3E}">
-        <p14:creationId xmlns:p14="http://schemas.microsoft.com/office/powerpoint/2010/main" val="474836953"/>
+        <p14:creationId xmlns:p14="http://schemas.microsoft.com/office/powerpoint/2010/main" val="1584163275"/>
       </p:ext>
     </p:extLst>
   </p:cSld>
@@ -1365,7 +1898,175 @@
     </p:spTree>
     <p:extLst>
       <p:ext uri="{BB962C8B-B14F-4D97-AF65-F5344CB8AC3E}">
-        <p14:creationId xmlns:p14="http://schemas.microsoft.com/office/powerpoint/2010/main" val="2544866760"/>
+        <p14:creationId xmlns:p14="http://schemas.microsoft.com/office/powerpoint/2010/main" val="1212799619"/>
+      </p:ext>
+    </p:extLst>
+  </p:cSld>
+  <p:clrMapOvr>
+    <a:masterClrMapping/>
+  </p:clrMapOvr>
+</p:notes>
+</file>
+
+<file path=ppt/notesSlides/notesSlide8.xml><?xml version="1.0" encoding="utf-8"?>
+<p:notes xmlns:a="http://schemas.openxmlformats.org/drawingml/2006/main" xmlns:r="http://schemas.openxmlformats.org/officeDocument/2006/relationships" xmlns:p="http://schemas.openxmlformats.org/presentationml/2006/main">
+  <p:cSld>
+    <p:spTree>
+      <p:nvGrpSpPr>
+        <p:cNvPr id="1" name=""/>
+        <p:cNvGrpSpPr/>
+        <p:nvPr/>
+      </p:nvGrpSpPr>
+      <p:grpSpPr>
+        <a:xfrm>
+          <a:off x="0" y="0"/>
+          <a:ext cx="0" cy="0"/>
+          <a:chOff x="0" y="0"/>
+          <a:chExt cx="0" cy="0"/>
+        </a:xfrm>
+      </p:grpSpPr>
+      <p:sp>
+        <p:nvSpPr>
+          <p:cNvPr id="2" name="슬라이드 이미지 개체 틀 1"/>
+          <p:cNvSpPr>
+            <a:spLocks noGrp="1" noRot="1" noChangeAspect="1"/>
+          </p:cNvSpPr>
+          <p:nvPr>
+            <p:ph type="sldImg"/>
+          </p:nvPr>
+        </p:nvSpPr>
+        <p:spPr/>
+      </p:sp>
+      <p:sp>
+        <p:nvSpPr>
+          <p:cNvPr id="3" name="슬라이드 노트 개체 틀 2"/>
+          <p:cNvSpPr>
+            <a:spLocks noGrp="1"/>
+          </p:cNvSpPr>
+          <p:nvPr>
+            <p:ph type="body" idx="1"/>
+          </p:nvPr>
+        </p:nvSpPr>
+        <p:spPr/>
+        <p:txBody>
+          <a:bodyPr/>
+          <a:lstStyle/>
+          <a:p>
+            <a:endParaRPr lang="ko-KR" altLang="en-US" dirty="0"/>
+          </a:p>
+        </p:txBody>
+      </p:sp>
+      <p:sp>
+        <p:nvSpPr>
+          <p:cNvPr id="4" name="슬라이드 번호 개체 틀 3"/>
+          <p:cNvSpPr>
+            <a:spLocks noGrp="1"/>
+          </p:cNvSpPr>
+          <p:nvPr>
+            <p:ph type="sldNum" sz="quarter" idx="5"/>
+          </p:nvPr>
+        </p:nvSpPr>
+        <p:spPr/>
+        <p:txBody>
+          <a:bodyPr/>
+          <a:lstStyle/>
+          <a:p>
+            <a:fld id="{6A098155-7AD0-496F-B1D1-934BA0926C43}" type="slidenum">
+              <a:rPr lang="ko-KR" altLang="en-US" smtClean="0"/>
+              <a:t>10</a:t>
+            </a:fld>
+            <a:endParaRPr lang="ko-KR" altLang="en-US"/>
+          </a:p>
+        </p:txBody>
+      </p:sp>
+    </p:spTree>
+    <p:extLst>
+      <p:ext uri="{BB962C8B-B14F-4D97-AF65-F5344CB8AC3E}">
+        <p14:creationId xmlns:p14="http://schemas.microsoft.com/office/powerpoint/2010/main" val="3502222560"/>
+      </p:ext>
+    </p:extLst>
+  </p:cSld>
+  <p:clrMapOvr>
+    <a:masterClrMapping/>
+  </p:clrMapOvr>
+</p:notes>
+</file>
+
+<file path=ppt/notesSlides/notesSlide9.xml><?xml version="1.0" encoding="utf-8"?>
+<p:notes xmlns:a="http://schemas.openxmlformats.org/drawingml/2006/main" xmlns:r="http://schemas.openxmlformats.org/officeDocument/2006/relationships" xmlns:p="http://schemas.openxmlformats.org/presentationml/2006/main">
+  <p:cSld>
+    <p:spTree>
+      <p:nvGrpSpPr>
+        <p:cNvPr id="1" name=""/>
+        <p:cNvGrpSpPr/>
+        <p:nvPr/>
+      </p:nvGrpSpPr>
+      <p:grpSpPr>
+        <a:xfrm>
+          <a:off x="0" y="0"/>
+          <a:ext cx="0" cy="0"/>
+          <a:chOff x="0" y="0"/>
+          <a:chExt cx="0" cy="0"/>
+        </a:xfrm>
+      </p:grpSpPr>
+      <p:sp>
+        <p:nvSpPr>
+          <p:cNvPr id="2" name="슬라이드 이미지 개체 틀 1"/>
+          <p:cNvSpPr>
+            <a:spLocks noGrp="1" noRot="1" noChangeAspect="1"/>
+          </p:cNvSpPr>
+          <p:nvPr>
+            <p:ph type="sldImg"/>
+          </p:nvPr>
+        </p:nvSpPr>
+        <p:spPr/>
+      </p:sp>
+      <p:sp>
+        <p:nvSpPr>
+          <p:cNvPr id="3" name="슬라이드 노트 개체 틀 2"/>
+          <p:cNvSpPr>
+            <a:spLocks noGrp="1"/>
+          </p:cNvSpPr>
+          <p:nvPr>
+            <p:ph type="body" idx="1"/>
+          </p:nvPr>
+        </p:nvSpPr>
+        <p:spPr/>
+        <p:txBody>
+          <a:bodyPr/>
+          <a:lstStyle/>
+          <a:p>
+            <a:endParaRPr lang="ko-KR" altLang="en-US" dirty="0"/>
+          </a:p>
+        </p:txBody>
+      </p:sp>
+      <p:sp>
+        <p:nvSpPr>
+          <p:cNvPr id="4" name="슬라이드 번호 개체 틀 3"/>
+          <p:cNvSpPr>
+            <a:spLocks noGrp="1"/>
+          </p:cNvSpPr>
+          <p:nvPr>
+            <p:ph type="sldNum" sz="quarter" idx="5"/>
+          </p:nvPr>
+        </p:nvSpPr>
+        <p:spPr/>
+        <p:txBody>
+          <a:bodyPr/>
+          <a:lstStyle/>
+          <a:p>
+            <a:fld id="{6A098155-7AD0-496F-B1D1-934BA0926C43}" type="slidenum">
+              <a:rPr lang="ko-KR" altLang="en-US" smtClean="0"/>
+              <a:t>11</a:t>
+            </a:fld>
+            <a:endParaRPr lang="ko-KR" altLang="en-US"/>
+          </a:p>
+        </p:txBody>
+      </p:sp>
+    </p:spTree>
+    <p:extLst>
+      <p:ext uri="{BB962C8B-B14F-4D97-AF65-F5344CB8AC3E}">
+        <p14:creationId xmlns:p14="http://schemas.microsoft.com/office/powerpoint/2010/main" val="474836953"/>
       </p:ext>
     </p:extLst>
   </p:cSld>
@@ -1522,7 +2223,7 @@
           <a:p>
             <a:fld id="{702974F5-ACFF-46A0-A8BD-AB3EE68D49D8}" type="datetimeFigureOut">
               <a:rPr lang="ko-KR" altLang="en-US" smtClean="0"/>
-              <a:t>2023-03-06</a:t>
+              <a:t>2023-03-07</a:t>
             </a:fld>
             <a:endParaRPr lang="ko-KR" altLang="en-US"/>
           </a:p>
@@ -1720,7 +2421,7 @@
           <a:p>
             <a:fld id="{702974F5-ACFF-46A0-A8BD-AB3EE68D49D8}" type="datetimeFigureOut">
               <a:rPr lang="ko-KR" altLang="en-US" smtClean="0"/>
-              <a:t>2023-03-06</a:t>
+              <a:t>2023-03-07</a:t>
             </a:fld>
             <a:endParaRPr lang="ko-KR" altLang="en-US"/>
           </a:p>
@@ -1928,7 +2629,7 @@
           <a:p>
             <a:fld id="{702974F5-ACFF-46A0-A8BD-AB3EE68D49D8}" type="datetimeFigureOut">
               <a:rPr lang="ko-KR" altLang="en-US" smtClean="0"/>
-              <a:t>2023-03-06</a:t>
+              <a:t>2023-03-07</a:t>
             </a:fld>
             <a:endParaRPr lang="ko-KR" altLang="en-US"/>
           </a:p>
@@ -2126,7 +2827,7 @@
           <a:p>
             <a:fld id="{702974F5-ACFF-46A0-A8BD-AB3EE68D49D8}" type="datetimeFigureOut">
               <a:rPr lang="ko-KR" altLang="en-US" smtClean="0"/>
-              <a:t>2023-03-06</a:t>
+              <a:t>2023-03-07</a:t>
             </a:fld>
             <a:endParaRPr lang="ko-KR" altLang="en-US"/>
           </a:p>
@@ -2401,7 +3102,7 @@
           <a:p>
             <a:fld id="{702974F5-ACFF-46A0-A8BD-AB3EE68D49D8}" type="datetimeFigureOut">
               <a:rPr lang="ko-KR" altLang="en-US" smtClean="0"/>
-              <a:t>2023-03-06</a:t>
+              <a:t>2023-03-07</a:t>
             </a:fld>
             <a:endParaRPr lang="ko-KR" altLang="en-US"/>
           </a:p>
@@ -2666,7 +3367,7 @@
           <a:p>
             <a:fld id="{702974F5-ACFF-46A0-A8BD-AB3EE68D49D8}" type="datetimeFigureOut">
               <a:rPr lang="ko-KR" altLang="en-US" smtClean="0"/>
-              <a:t>2023-03-06</a:t>
+              <a:t>2023-03-07</a:t>
             </a:fld>
             <a:endParaRPr lang="ko-KR" altLang="en-US"/>
           </a:p>
@@ -3078,7 +3779,7 @@
           <a:p>
             <a:fld id="{702974F5-ACFF-46A0-A8BD-AB3EE68D49D8}" type="datetimeFigureOut">
               <a:rPr lang="ko-KR" altLang="en-US" smtClean="0"/>
-              <a:t>2023-03-06</a:t>
+              <a:t>2023-03-07</a:t>
             </a:fld>
             <a:endParaRPr lang="ko-KR" altLang="en-US"/>
           </a:p>
@@ -3219,7 +3920,7 @@
           <a:p>
             <a:fld id="{702974F5-ACFF-46A0-A8BD-AB3EE68D49D8}" type="datetimeFigureOut">
               <a:rPr lang="ko-KR" altLang="en-US" smtClean="0"/>
-              <a:t>2023-03-06</a:t>
+              <a:t>2023-03-07</a:t>
             </a:fld>
             <a:endParaRPr lang="ko-KR" altLang="en-US"/>
           </a:p>
@@ -3332,7 +4033,7 @@
           <a:p>
             <a:fld id="{702974F5-ACFF-46A0-A8BD-AB3EE68D49D8}" type="datetimeFigureOut">
               <a:rPr lang="ko-KR" altLang="en-US" smtClean="0"/>
-              <a:t>2023-03-06</a:t>
+              <a:t>2023-03-07</a:t>
             </a:fld>
             <a:endParaRPr lang="ko-KR" altLang="en-US"/>
           </a:p>
@@ -3643,7 +4344,7 @@
           <a:p>
             <a:fld id="{702974F5-ACFF-46A0-A8BD-AB3EE68D49D8}" type="datetimeFigureOut">
               <a:rPr lang="ko-KR" altLang="en-US" smtClean="0"/>
-              <a:t>2023-03-06</a:t>
+              <a:t>2023-03-07</a:t>
             </a:fld>
             <a:endParaRPr lang="ko-KR" altLang="en-US"/>
           </a:p>
@@ -3931,7 +4632,7 @@
           <a:p>
             <a:fld id="{702974F5-ACFF-46A0-A8BD-AB3EE68D49D8}" type="datetimeFigureOut">
               <a:rPr lang="ko-KR" altLang="en-US" smtClean="0"/>
-              <a:t>2023-03-06</a:t>
+              <a:t>2023-03-07</a:t>
             </a:fld>
             <a:endParaRPr lang="ko-KR" altLang="en-US"/>
           </a:p>
@@ -4172,7 +4873,7 @@
           <a:p>
             <a:fld id="{702974F5-ACFF-46A0-A8BD-AB3EE68D49D8}" type="datetimeFigureOut">
               <a:rPr lang="ko-KR" altLang="en-US" smtClean="0"/>
-              <a:t>2023-03-06</a:t>
+              <a:t>2023-03-07</a:t>
             </a:fld>
             <a:endParaRPr lang="ko-KR" altLang="en-US"/>
           </a:p>
@@ -5206,6 +5907,2143 @@
 </p:sld>
 </file>
 
+<file path=ppt/slides/slide10.xml><?xml version="1.0" encoding="utf-8"?>
+<p:sld xmlns:a="http://schemas.openxmlformats.org/drawingml/2006/main" xmlns:r="http://schemas.openxmlformats.org/officeDocument/2006/relationships" xmlns:p="http://schemas.openxmlformats.org/presentationml/2006/main">
+  <p:cSld>
+    <p:spTree>
+      <p:nvGrpSpPr>
+        <p:cNvPr id="1" name=""/>
+        <p:cNvGrpSpPr/>
+        <p:nvPr/>
+      </p:nvGrpSpPr>
+      <p:grpSpPr>
+        <a:xfrm>
+          <a:off x="0" y="0"/>
+          <a:ext cx="0" cy="0"/>
+          <a:chOff x="0" y="0"/>
+          <a:chExt cx="0" cy="0"/>
+        </a:xfrm>
+      </p:grpSpPr>
+      <p:sp>
+        <p:nvSpPr>
+          <p:cNvPr id="2" name="제목 1">
+            <a:extLst>
+              <a:ext uri="{FF2B5EF4-FFF2-40B4-BE49-F238E27FC236}">
+                <a16:creationId xmlns:a16="http://schemas.microsoft.com/office/drawing/2014/main" id="{0423823E-CA6D-0DFA-4403-A7FC715FD5E2}"/>
+              </a:ext>
+            </a:extLst>
+          </p:cNvPr>
+          <p:cNvSpPr>
+            <a:spLocks noGrp="1"/>
+          </p:cNvSpPr>
+          <p:nvPr>
+            <p:ph type="title"/>
+          </p:nvPr>
+        </p:nvSpPr>
+        <p:spPr>
+          <a:xfrm>
+            <a:off x="457200" y="177864"/>
+            <a:ext cx="10515600" cy="1325563"/>
+          </a:xfrm>
+        </p:spPr>
+        <p:txBody>
+          <a:bodyPr/>
+          <a:lstStyle/>
+          <a:p>
+            <a:r>
+              <a:rPr lang="ko-KR" altLang="en-US" dirty="0">
+                <a:solidFill>
+                  <a:srgbClr val="F56D6D"/>
+                </a:solidFill>
+                <a:latin typeface="에스코어 드림 9 Black" panose="020B0A03030302020204" pitchFamily="34" charset="-127"/>
+                <a:ea typeface="에스코어 드림 9 Black" panose="020B0A03030302020204" pitchFamily="34" charset="-127"/>
+              </a:rPr>
+              <a:t>개발</a:t>
+            </a:r>
+            <a:r>
+              <a:rPr lang="ko-KR" altLang="en-US" dirty="0">
+                <a:solidFill>
+                  <a:srgbClr val="3679A4"/>
+                </a:solidFill>
+                <a:latin typeface="에스코어 드림 9 Black" panose="020B0A03030302020204" pitchFamily="34" charset="-127"/>
+                <a:ea typeface="에스코어 드림 9 Black" panose="020B0A03030302020204" pitchFamily="34" charset="-127"/>
+              </a:rPr>
+              <a:t> 내용</a:t>
+            </a:r>
+          </a:p>
+        </p:txBody>
+      </p:sp>
+      <p:pic>
+        <p:nvPicPr>
+          <p:cNvPr id="5" name="그림 4" descr="운동기이(가) 표시된 사진&#10;&#10;자동 생성된 설명">
+            <a:extLst>
+              <a:ext uri="{FF2B5EF4-FFF2-40B4-BE49-F238E27FC236}">
+                <a16:creationId xmlns:a16="http://schemas.microsoft.com/office/drawing/2014/main" id="{B73213FD-647B-9C5A-4FCC-E5CDC4EBEFA6}"/>
+              </a:ext>
+            </a:extLst>
+          </p:cNvPr>
+          <p:cNvPicPr>
+            <a:picLocks noChangeAspect="1"/>
+          </p:cNvPicPr>
+          <p:nvPr/>
+        </p:nvPicPr>
+        <p:blipFill>
+          <a:blip r:embed="rId3">
+            <a:extLst>
+              <a:ext uri="{28A0092B-C50C-407E-A947-70E740481C1C}">
+                <a14:useLocalDpi xmlns:a14="http://schemas.microsoft.com/office/drawing/2010/main" val="0"/>
+              </a:ext>
+            </a:extLst>
+          </a:blip>
+          <a:stretch>
+            <a:fillRect/>
+          </a:stretch>
+        </p:blipFill>
+        <p:spPr>
+          <a:xfrm>
+            <a:off x="3752767" y="1085767"/>
+            <a:ext cx="4686465" cy="4686465"/>
+          </a:xfrm>
+          <a:prstGeom prst="rect">
+            <a:avLst/>
+          </a:prstGeom>
+        </p:spPr>
+      </p:pic>
+      <p:cxnSp>
+        <p:nvCxnSpPr>
+          <p:cNvPr id="8" name="직선 연결선 7">
+            <a:extLst>
+              <a:ext uri="{FF2B5EF4-FFF2-40B4-BE49-F238E27FC236}">
+                <a16:creationId xmlns:a16="http://schemas.microsoft.com/office/drawing/2014/main" id="{033313D3-38E8-62A4-AD82-5368DFC7C8A9}"/>
+              </a:ext>
+            </a:extLst>
+          </p:cNvPr>
+          <p:cNvCxnSpPr/>
+          <p:nvPr/>
+        </p:nvCxnSpPr>
+        <p:spPr>
+          <a:xfrm>
+            <a:off x="8235882" y="1571780"/>
+            <a:ext cx="0" cy="895547"/>
+          </a:xfrm>
+          <a:prstGeom prst="line">
+            <a:avLst/>
+          </a:prstGeom>
+          <a:ln w="28575">
+            <a:solidFill>
+              <a:schemeClr val="bg1">
+                <a:lumMod val="65000"/>
+              </a:schemeClr>
+            </a:solidFill>
+          </a:ln>
+        </p:spPr>
+        <p:style>
+          <a:lnRef idx="1">
+            <a:schemeClr val="accent1"/>
+          </a:lnRef>
+          <a:fillRef idx="0">
+            <a:schemeClr val="accent1"/>
+          </a:fillRef>
+          <a:effectRef idx="0">
+            <a:schemeClr val="accent1"/>
+          </a:effectRef>
+          <a:fontRef idx="minor">
+            <a:schemeClr val="tx1"/>
+          </a:fontRef>
+        </p:style>
+      </p:cxnSp>
+      <p:sp>
+        <p:nvSpPr>
+          <p:cNvPr id="9" name="TextBox 8">
+            <a:extLst>
+              <a:ext uri="{FF2B5EF4-FFF2-40B4-BE49-F238E27FC236}">
+                <a16:creationId xmlns:a16="http://schemas.microsoft.com/office/drawing/2014/main" id="{9773BC77-9DBD-7E3E-D5AE-8774680C00FD}"/>
+              </a:ext>
+            </a:extLst>
+          </p:cNvPr>
+          <p:cNvSpPr txBox="1"/>
+          <p:nvPr/>
+        </p:nvSpPr>
+        <p:spPr>
+          <a:xfrm>
+            <a:off x="8363144" y="1686960"/>
+            <a:ext cx="1847653" cy="677108"/>
+          </a:xfrm>
+          <a:prstGeom prst="rect">
+            <a:avLst/>
+          </a:prstGeom>
+          <a:noFill/>
+        </p:spPr>
+        <p:txBody>
+          <a:bodyPr wrap="square" rtlCol="0">
+            <a:spAutoFit/>
+          </a:bodyPr>
+          <a:lstStyle/>
+          <a:p>
+            <a:pPr algn="ctr"/>
+            <a:r>
+              <a:rPr lang="en-US" altLang="ko-KR" sz="2000" dirty="0">
+                <a:solidFill>
+                  <a:schemeClr val="bg1">
+                    <a:lumMod val="50000"/>
+                  </a:schemeClr>
+                </a:solidFill>
+                <a:latin typeface="에스코어 드림 4 Regular" panose="020B0503030302020204" pitchFamily="34" charset="-127"/>
+                <a:ea typeface="에스코어 드림 4 Regular" panose="020B0503030302020204" pitchFamily="34" charset="-127"/>
+              </a:rPr>
+              <a:t>Raspberry pi</a:t>
+            </a:r>
+          </a:p>
+          <a:p>
+            <a:pPr algn="ctr"/>
+            <a:r>
+              <a:rPr lang="en-US" altLang="ko-KR" dirty="0">
+                <a:solidFill>
+                  <a:schemeClr val="bg1">
+                    <a:lumMod val="50000"/>
+                  </a:schemeClr>
+                </a:solidFill>
+                <a:latin typeface="에스코어 드림 4 Regular" panose="020B0503030302020204" pitchFamily="34" charset="-127"/>
+                <a:ea typeface="에스코어 드림 4 Regular" panose="020B0503030302020204" pitchFamily="34" charset="-127"/>
+              </a:rPr>
+              <a:t>45g</a:t>
+            </a:r>
+            <a:endParaRPr lang="ko-KR" altLang="en-US" dirty="0">
+              <a:solidFill>
+                <a:schemeClr val="bg1">
+                  <a:lumMod val="50000"/>
+                </a:schemeClr>
+              </a:solidFill>
+              <a:latin typeface="에스코어 드림 4 Regular" panose="020B0503030302020204" pitchFamily="34" charset="-127"/>
+              <a:ea typeface="에스코어 드림 4 Regular" panose="020B0503030302020204" pitchFamily="34" charset="-127"/>
+            </a:endParaRPr>
+          </a:p>
+        </p:txBody>
+      </p:sp>
+      <p:cxnSp>
+        <p:nvCxnSpPr>
+          <p:cNvPr id="11" name="직선 연결선 10">
+            <a:extLst>
+              <a:ext uri="{FF2B5EF4-FFF2-40B4-BE49-F238E27FC236}">
+                <a16:creationId xmlns:a16="http://schemas.microsoft.com/office/drawing/2014/main" id="{971AF966-E00E-11FC-3B77-960D076916E7}"/>
+              </a:ext>
+            </a:extLst>
+          </p:cNvPr>
+          <p:cNvCxnSpPr/>
+          <p:nvPr/>
+        </p:nvCxnSpPr>
+        <p:spPr>
+          <a:xfrm>
+            <a:off x="8235882" y="4368888"/>
+            <a:ext cx="0" cy="895547"/>
+          </a:xfrm>
+          <a:prstGeom prst="line">
+            <a:avLst/>
+          </a:prstGeom>
+          <a:ln w="28575">
+            <a:solidFill>
+              <a:schemeClr val="bg1">
+                <a:lumMod val="65000"/>
+              </a:schemeClr>
+            </a:solidFill>
+          </a:ln>
+        </p:spPr>
+        <p:style>
+          <a:lnRef idx="1">
+            <a:schemeClr val="accent1"/>
+          </a:lnRef>
+          <a:fillRef idx="0">
+            <a:schemeClr val="accent1"/>
+          </a:fillRef>
+          <a:effectRef idx="0">
+            <a:schemeClr val="accent1"/>
+          </a:effectRef>
+          <a:fontRef idx="minor">
+            <a:schemeClr val="tx1"/>
+          </a:fontRef>
+        </p:style>
+      </p:cxnSp>
+      <p:sp>
+        <p:nvSpPr>
+          <p:cNvPr id="12" name="TextBox 11">
+            <a:extLst>
+              <a:ext uri="{FF2B5EF4-FFF2-40B4-BE49-F238E27FC236}">
+                <a16:creationId xmlns:a16="http://schemas.microsoft.com/office/drawing/2014/main" id="{3F7B1382-DD51-8235-4FEB-D379D0989307}"/>
+              </a:ext>
+            </a:extLst>
+          </p:cNvPr>
+          <p:cNvSpPr txBox="1"/>
+          <p:nvPr/>
+        </p:nvSpPr>
+        <p:spPr>
+          <a:xfrm>
+            <a:off x="8363144" y="4474641"/>
+            <a:ext cx="1847653" cy="677108"/>
+          </a:xfrm>
+          <a:prstGeom prst="rect">
+            <a:avLst/>
+          </a:prstGeom>
+          <a:noFill/>
+        </p:spPr>
+        <p:txBody>
+          <a:bodyPr wrap="square" rtlCol="0">
+            <a:spAutoFit/>
+          </a:bodyPr>
+          <a:lstStyle/>
+          <a:p>
+            <a:pPr algn="ctr"/>
+            <a:r>
+              <a:rPr lang="en-US" altLang="ko-KR" sz="2000" dirty="0" err="1">
+                <a:solidFill>
+                  <a:schemeClr val="bg1">
+                    <a:lumMod val="50000"/>
+                  </a:schemeClr>
+                </a:solidFill>
+                <a:latin typeface="에스코어 드림 4 Regular" panose="020B0503030302020204" pitchFamily="34" charset="-127"/>
+                <a:ea typeface="에스코어 드림 4 Regular" panose="020B0503030302020204" pitchFamily="34" charset="-127"/>
+              </a:rPr>
+              <a:t>storbe</a:t>
+            </a:r>
+            <a:r>
+              <a:rPr lang="en-US" altLang="ko-KR" sz="2000" dirty="0">
+                <a:solidFill>
+                  <a:schemeClr val="bg1">
+                    <a:lumMod val="50000"/>
+                  </a:schemeClr>
+                </a:solidFill>
+                <a:latin typeface="에스코어 드림 4 Regular" panose="020B0503030302020204" pitchFamily="34" charset="-127"/>
+                <a:ea typeface="에스코어 드림 4 Regular" panose="020B0503030302020204" pitchFamily="34" charset="-127"/>
+              </a:rPr>
+              <a:t> light</a:t>
+            </a:r>
+          </a:p>
+          <a:p>
+            <a:pPr algn="ctr"/>
+            <a:r>
+              <a:rPr lang="en-US" altLang="ko-KR" dirty="0">
+                <a:solidFill>
+                  <a:schemeClr val="bg1">
+                    <a:lumMod val="50000"/>
+                  </a:schemeClr>
+                </a:solidFill>
+                <a:latin typeface="에스코어 드림 4 Regular" panose="020B0503030302020204" pitchFamily="34" charset="-127"/>
+                <a:ea typeface="에스코어 드림 4 Regular" panose="020B0503030302020204" pitchFamily="34" charset="-127"/>
+              </a:rPr>
+              <a:t>126g</a:t>
+            </a:r>
+            <a:endParaRPr lang="ko-KR" altLang="en-US" dirty="0">
+              <a:solidFill>
+                <a:schemeClr val="bg1">
+                  <a:lumMod val="50000"/>
+                </a:schemeClr>
+              </a:solidFill>
+              <a:latin typeface="에스코어 드림 4 Regular" panose="020B0503030302020204" pitchFamily="34" charset="-127"/>
+              <a:ea typeface="에스코어 드림 4 Regular" panose="020B0503030302020204" pitchFamily="34" charset="-127"/>
+            </a:endParaRPr>
+          </a:p>
+        </p:txBody>
+      </p:sp>
+      <p:cxnSp>
+        <p:nvCxnSpPr>
+          <p:cNvPr id="13" name="직선 연결선 12">
+            <a:extLst>
+              <a:ext uri="{FF2B5EF4-FFF2-40B4-BE49-F238E27FC236}">
+                <a16:creationId xmlns:a16="http://schemas.microsoft.com/office/drawing/2014/main" id="{7D708F1A-D97D-651D-721D-58C61E835904}"/>
+              </a:ext>
+            </a:extLst>
+          </p:cNvPr>
+          <p:cNvCxnSpPr>
+            <a:cxnSpLocks/>
+          </p:cNvCxnSpPr>
+          <p:nvPr/>
+        </p:nvCxnSpPr>
+        <p:spPr>
+          <a:xfrm>
+            <a:off x="3956119" y="1693891"/>
+            <a:ext cx="0" cy="895547"/>
+          </a:xfrm>
+          <a:prstGeom prst="line">
+            <a:avLst/>
+          </a:prstGeom>
+          <a:ln w="28575">
+            <a:solidFill>
+              <a:schemeClr val="bg1">
+                <a:lumMod val="65000"/>
+              </a:schemeClr>
+            </a:solidFill>
+          </a:ln>
+        </p:spPr>
+        <p:style>
+          <a:lnRef idx="1">
+            <a:schemeClr val="accent1"/>
+          </a:lnRef>
+          <a:fillRef idx="0">
+            <a:schemeClr val="accent1"/>
+          </a:fillRef>
+          <a:effectRef idx="0">
+            <a:schemeClr val="accent1"/>
+          </a:effectRef>
+          <a:fontRef idx="minor">
+            <a:schemeClr val="tx1"/>
+          </a:fontRef>
+        </p:style>
+      </p:cxnSp>
+      <p:sp>
+        <p:nvSpPr>
+          <p:cNvPr id="14" name="TextBox 13">
+            <a:extLst>
+              <a:ext uri="{FF2B5EF4-FFF2-40B4-BE49-F238E27FC236}">
+                <a16:creationId xmlns:a16="http://schemas.microsoft.com/office/drawing/2014/main" id="{5D8B7ACB-8F3B-C8B1-0211-AD5E01FD349A}"/>
+              </a:ext>
+            </a:extLst>
+          </p:cNvPr>
+          <p:cNvSpPr txBox="1"/>
+          <p:nvPr/>
+        </p:nvSpPr>
+        <p:spPr>
+          <a:xfrm>
+            <a:off x="1366888" y="1790219"/>
+            <a:ext cx="2589232" cy="677108"/>
+          </a:xfrm>
+          <a:prstGeom prst="rect">
+            <a:avLst/>
+          </a:prstGeom>
+          <a:noFill/>
+        </p:spPr>
+        <p:txBody>
+          <a:bodyPr wrap="square" rtlCol="0">
+            <a:spAutoFit/>
+          </a:bodyPr>
+          <a:lstStyle/>
+          <a:p>
+            <a:pPr algn="ctr"/>
+            <a:r>
+              <a:rPr lang="en-US" altLang="ko-KR" sz="2000" dirty="0" err="1">
+                <a:solidFill>
+                  <a:schemeClr val="bg1">
+                    <a:lumMod val="50000"/>
+                  </a:schemeClr>
+                </a:solidFill>
+                <a:latin typeface="에스코어 드림 4 Regular" panose="020B0503030302020204" pitchFamily="34" charset="-127"/>
+                <a:ea typeface="에스코어 드림 4 Regular" panose="020B0503030302020204" pitchFamily="34" charset="-127"/>
+              </a:rPr>
+              <a:t>Pixhwak</a:t>
+            </a:r>
+            <a:r>
+              <a:rPr lang="en-US" altLang="ko-KR" sz="2000" dirty="0">
+                <a:solidFill>
+                  <a:schemeClr val="bg1">
+                    <a:lumMod val="50000"/>
+                  </a:schemeClr>
+                </a:solidFill>
+                <a:latin typeface="에스코어 드림 4 Regular" panose="020B0503030302020204" pitchFamily="34" charset="-127"/>
+                <a:ea typeface="에스코어 드림 4 Regular" panose="020B0503030302020204" pitchFamily="34" charset="-127"/>
+              </a:rPr>
+              <a:t> &amp; Sensor</a:t>
+            </a:r>
+          </a:p>
+          <a:p>
+            <a:pPr algn="ctr"/>
+            <a:r>
+              <a:rPr lang="en-US" altLang="ko-KR" dirty="0">
+                <a:solidFill>
+                  <a:schemeClr val="bg1">
+                    <a:lumMod val="50000"/>
+                  </a:schemeClr>
+                </a:solidFill>
+                <a:latin typeface="에스코어 드림 4 Regular" panose="020B0503030302020204" pitchFamily="34" charset="-127"/>
+                <a:ea typeface="에스코어 드림 4 Regular" panose="020B0503030302020204" pitchFamily="34" charset="-127"/>
+              </a:rPr>
+              <a:t>50g</a:t>
+            </a:r>
+            <a:endParaRPr lang="ko-KR" altLang="en-US" dirty="0">
+              <a:solidFill>
+                <a:schemeClr val="bg1">
+                  <a:lumMod val="50000"/>
+                </a:schemeClr>
+              </a:solidFill>
+              <a:latin typeface="에스코어 드림 4 Regular" panose="020B0503030302020204" pitchFamily="34" charset="-127"/>
+              <a:ea typeface="에스코어 드림 4 Regular" panose="020B0503030302020204" pitchFamily="34" charset="-127"/>
+            </a:endParaRPr>
+          </a:p>
+        </p:txBody>
+      </p:sp>
+      <p:cxnSp>
+        <p:nvCxnSpPr>
+          <p:cNvPr id="16" name="직선 연결선 15">
+            <a:extLst>
+              <a:ext uri="{FF2B5EF4-FFF2-40B4-BE49-F238E27FC236}">
+                <a16:creationId xmlns:a16="http://schemas.microsoft.com/office/drawing/2014/main" id="{10CE8AFE-E135-62C5-DD42-E048CB45694E}"/>
+              </a:ext>
+            </a:extLst>
+          </p:cNvPr>
+          <p:cNvCxnSpPr>
+            <a:cxnSpLocks/>
+          </p:cNvCxnSpPr>
+          <p:nvPr/>
+        </p:nvCxnSpPr>
+        <p:spPr>
+          <a:xfrm>
+            <a:off x="3956119" y="4392176"/>
+            <a:ext cx="0" cy="895547"/>
+          </a:xfrm>
+          <a:prstGeom prst="line">
+            <a:avLst/>
+          </a:prstGeom>
+          <a:ln w="28575">
+            <a:solidFill>
+              <a:schemeClr val="bg1">
+                <a:lumMod val="65000"/>
+              </a:schemeClr>
+            </a:solidFill>
+          </a:ln>
+        </p:spPr>
+        <p:style>
+          <a:lnRef idx="1">
+            <a:schemeClr val="accent1"/>
+          </a:lnRef>
+          <a:fillRef idx="0">
+            <a:schemeClr val="accent1"/>
+          </a:fillRef>
+          <a:effectRef idx="0">
+            <a:schemeClr val="accent1"/>
+          </a:effectRef>
+          <a:fontRef idx="minor">
+            <a:schemeClr val="tx1"/>
+          </a:fontRef>
+        </p:style>
+      </p:cxnSp>
+      <p:sp>
+        <p:nvSpPr>
+          <p:cNvPr id="17" name="TextBox 16">
+            <a:extLst>
+              <a:ext uri="{FF2B5EF4-FFF2-40B4-BE49-F238E27FC236}">
+                <a16:creationId xmlns:a16="http://schemas.microsoft.com/office/drawing/2014/main" id="{DD2D0035-986D-639A-71EF-CE8FB183BB29}"/>
+              </a:ext>
+            </a:extLst>
+          </p:cNvPr>
+          <p:cNvSpPr txBox="1"/>
+          <p:nvPr/>
+        </p:nvSpPr>
+        <p:spPr>
+          <a:xfrm>
+            <a:off x="2108466" y="4488504"/>
+            <a:ext cx="1847653" cy="677108"/>
+          </a:xfrm>
+          <a:prstGeom prst="rect">
+            <a:avLst/>
+          </a:prstGeom>
+          <a:noFill/>
+        </p:spPr>
+        <p:txBody>
+          <a:bodyPr wrap="square" rtlCol="0">
+            <a:spAutoFit/>
+          </a:bodyPr>
+          <a:lstStyle/>
+          <a:p>
+            <a:pPr algn="ctr"/>
+            <a:r>
+              <a:rPr lang="en-US" altLang="ko-KR" sz="2000" dirty="0">
+                <a:solidFill>
+                  <a:schemeClr val="bg1">
+                    <a:lumMod val="50000"/>
+                  </a:schemeClr>
+                </a:solidFill>
+                <a:latin typeface="에스코어 드림 4 Regular" panose="020B0503030302020204" pitchFamily="34" charset="-127"/>
+                <a:ea typeface="에스코어 드림 4 Regular" panose="020B0503030302020204" pitchFamily="34" charset="-127"/>
+              </a:rPr>
+              <a:t>Motor</a:t>
+            </a:r>
+          </a:p>
+          <a:p>
+            <a:pPr algn="ctr"/>
+            <a:r>
+              <a:rPr lang="en-US" altLang="ko-KR" dirty="0">
+                <a:solidFill>
+                  <a:schemeClr val="bg1">
+                    <a:lumMod val="50000"/>
+                  </a:schemeClr>
+                </a:solidFill>
+                <a:latin typeface="에스코어 드림 4 Regular" panose="020B0503030302020204" pitchFamily="34" charset="-127"/>
+                <a:ea typeface="에스코어 드림 4 Regular" panose="020B0503030302020204" pitchFamily="34" charset="-127"/>
+              </a:rPr>
+              <a:t>212g</a:t>
+            </a:r>
+            <a:endParaRPr lang="ko-KR" altLang="en-US" dirty="0">
+              <a:solidFill>
+                <a:schemeClr val="bg1">
+                  <a:lumMod val="50000"/>
+                </a:schemeClr>
+              </a:solidFill>
+              <a:latin typeface="에스코어 드림 4 Regular" panose="020B0503030302020204" pitchFamily="34" charset="-127"/>
+              <a:ea typeface="에스코어 드림 4 Regular" panose="020B0503030302020204" pitchFamily="34" charset="-127"/>
+            </a:endParaRPr>
+          </a:p>
+        </p:txBody>
+      </p:sp>
+      <p:sp>
+        <p:nvSpPr>
+          <p:cNvPr id="19" name="TextBox 18">
+            <a:extLst>
+              <a:ext uri="{FF2B5EF4-FFF2-40B4-BE49-F238E27FC236}">
+                <a16:creationId xmlns:a16="http://schemas.microsoft.com/office/drawing/2014/main" id="{BEB45CD6-FAE6-1FB0-4D6B-DA356F7DADB9}"/>
+              </a:ext>
+            </a:extLst>
+          </p:cNvPr>
+          <p:cNvSpPr txBox="1"/>
+          <p:nvPr/>
+        </p:nvSpPr>
+        <p:spPr>
+          <a:xfrm>
+            <a:off x="5242873" y="4610615"/>
+            <a:ext cx="1706252" cy="677108"/>
+          </a:xfrm>
+          <a:prstGeom prst="rect">
+            <a:avLst/>
+          </a:prstGeom>
+          <a:noFill/>
+        </p:spPr>
+        <p:txBody>
+          <a:bodyPr wrap="square" rtlCol="0">
+            <a:spAutoFit/>
+          </a:bodyPr>
+          <a:lstStyle/>
+          <a:p>
+            <a:pPr algn="ctr"/>
+            <a:r>
+              <a:rPr lang="en-US" altLang="ko-KR" sz="2000" dirty="0">
+                <a:solidFill>
+                  <a:schemeClr val="bg1">
+                    <a:lumMod val="50000"/>
+                  </a:schemeClr>
+                </a:solidFill>
+              </a:rPr>
+              <a:t>Drone</a:t>
+            </a:r>
+          </a:p>
+          <a:p>
+            <a:pPr algn="ctr"/>
+            <a:r>
+              <a:rPr lang="en-US" altLang="ko-KR" dirty="0">
+                <a:solidFill>
+                  <a:schemeClr val="bg1">
+                    <a:lumMod val="50000"/>
+                  </a:schemeClr>
+                </a:solidFill>
+              </a:rPr>
+              <a:t>1.3kg</a:t>
+            </a:r>
+            <a:endParaRPr lang="ko-KR" altLang="en-US" dirty="0">
+              <a:solidFill>
+                <a:schemeClr val="bg1">
+                  <a:lumMod val="50000"/>
+                </a:schemeClr>
+              </a:solidFill>
+            </a:endParaRPr>
+          </a:p>
+        </p:txBody>
+      </p:sp>
+    </p:spTree>
+    <p:extLst>
+      <p:ext uri="{BB962C8B-B14F-4D97-AF65-F5344CB8AC3E}">
+        <p14:creationId xmlns:p14="http://schemas.microsoft.com/office/powerpoint/2010/main" val="3857249578"/>
+      </p:ext>
+    </p:extLst>
+  </p:cSld>
+  <p:clrMapOvr>
+    <a:masterClrMapping/>
+  </p:clrMapOvr>
+</p:sld>
+</file>
+
+<file path=ppt/slides/slide11.xml><?xml version="1.0" encoding="utf-8"?>
+<p:sld xmlns:a="http://schemas.openxmlformats.org/drawingml/2006/main" xmlns:r="http://schemas.openxmlformats.org/officeDocument/2006/relationships" xmlns:p="http://schemas.openxmlformats.org/presentationml/2006/main">
+  <p:cSld>
+    <p:spTree>
+      <p:nvGrpSpPr>
+        <p:cNvPr id="1" name=""/>
+        <p:cNvGrpSpPr/>
+        <p:nvPr/>
+      </p:nvGrpSpPr>
+      <p:grpSpPr>
+        <a:xfrm>
+          <a:off x="0" y="0"/>
+          <a:ext cx="0" cy="0"/>
+          <a:chOff x="0" y="0"/>
+          <a:chExt cx="0" cy="0"/>
+        </a:xfrm>
+      </p:grpSpPr>
+      <p:sp>
+        <p:nvSpPr>
+          <p:cNvPr id="2" name="제목 1">
+            <a:extLst>
+              <a:ext uri="{FF2B5EF4-FFF2-40B4-BE49-F238E27FC236}">
+                <a16:creationId xmlns:a16="http://schemas.microsoft.com/office/drawing/2014/main" id="{0423823E-CA6D-0DFA-4403-A7FC715FD5E2}"/>
+              </a:ext>
+            </a:extLst>
+          </p:cNvPr>
+          <p:cNvSpPr>
+            <a:spLocks noGrp="1"/>
+          </p:cNvSpPr>
+          <p:nvPr>
+            <p:ph type="title"/>
+          </p:nvPr>
+        </p:nvSpPr>
+        <p:spPr>
+          <a:xfrm>
+            <a:off x="457200" y="159011"/>
+            <a:ext cx="10515600" cy="1325563"/>
+          </a:xfrm>
+        </p:spPr>
+        <p:txBody>
+          <a:bodyPr/>
+          <a:lstStyle/>
+          <a:p>
+            <a:r>
+              <a:rPr lang="ko-KR" altLang="en-US" dirty="0">
+                <a:solidFill>
+                  <a:srgbClr val="F56D6D"/>
+                </a:solidFill>
+                <a:latin typeface="에스코어 드림 9 Black" panose="020B0A03030302020204" pitchFamily="34" charset="-127"/>
+                <a:ea typeface="에스코어 드림 9 Black" panose="020B0A03030302020204" pitchFamily="34" charset="-127"/>
+              </a:rPr>
+              <a:t>예상</a:t>
+            </a:r>
+            <a:r>
+              <a:rPr lang="ko-KR" altLang="en-US" dirty="0">
+                <a:solidFill>
+                  <a:srgbClr val="3679A4"/>
+                </a:solidFill>
+                <a:latin typeface="에스코어 드림 9 Black" panose="020B0A03030302020204" pitchFamily="34" charset="-127"/>
+                <a:ea typeface="에스코어 드림 9 Black" panose="020B0A03030302020204" pitchFamily="34" charset="-127"/>
+              </a:rPr>
+              <a:t> 결과물</a:t>
+            </a:r>
+            <a:endParaRPr lang="ko-KR" altLang="en-US" dirty="0">
+              <a:solidFill>
+                <a:srgbClr val="F56D6D"/>
+              </a:solidFill>
+              <a:latin typeface="에스코어 드림 9 Black" panose="020B0A03030302020204" pitchFamily="34" charset="-127"/>
+              <a:ea typeface="에스코어 드림 9 Black" panose="020B0A03030302020204" pitchFamily="34" charset="-127"/>
+            </a:endParaRPr>
+          </a:p>
+        </p:txBody>
+      </p:sp>
+      <p:graphicFrame>
+        <p:nvGraphicFramePr>
+          <p:cNvPr id="3" name="표 3">
+            <a:extLst>
+              <a:ext uri="{FF2B5EF4-FFF2-40B4-BE49-F238E27FC236}">
+                <a16:creationId xmlns:a16="http://schemas.microsoft.com/office/drawing/2014/main" id="{AE2BF95F-E8AD-1971-CA74-3944326E59D1}"/>
+              </a:ext>
+            </a:extLst>
+          </p:cNvPr>
+          <p:cNvGraphicFramePr>
+            <a:graphicFrameLocks noGrp="1"/>
+          </p:cNvGraphicFramePr>
+          <p:nvPr>
+            <p:extLst>
+              <p:ext uri="{D42A27DB-BD31-4B8C-83A1-F6EECF244321}">
+                <p14:modId xmlns:p14="http://schemas.microsoft.com/office/powerpoint/2010/main" val="1618965902"/>
+              </p:ext>
+            </p:extLst>
+          </p:nvPr>
+        </p:nvGraphicFramePr>
+        <p:xfrm>
+          <a:off x="817905" y="1300900"/>
+          <a:ext cx="9794190" cy="4949074"/>
+        </p:xfrm>
+        <a:graphic>
+          <a:graphicData uri="http://schemas.openxmlformats.org/drawingml/2006/table">
+            <a:tbl>
+              <a:tblPr>
+                <a:tableStyleId>{5C22544A-7EE6-4342-B048-85BDC9FD1C3A}</a:tableStyleId>
+              </a:tblPr>
+              <a:tblGrid>
+                <a:gridCol w="3264730">
+                  <a:extLst>
+                    <a:ext uri="{9D8B030D-6E8A-4147-A177-3AD203B41FA5}">
+                      <a16:colId xmlns:a16="http://schemas.microsoft.com/office/drawing/2014/main" val="3085174004"/>
+                    </a:ext>
+                  </a:extLst>
+                </a:gridCol>
+                <a:gridCol w="3264730">
+                  <a:extLst>
+                    <a:ext uri="{9D8B030D-6E8A-4147-A177-3AD203B41FA5}">
+                      <a16:colId xmlns:a16="http://schemas.microsoft.com/office/drawing/2014/main" val="1569329845"/>
+                    </a:ext>
+                  </a:extLst>
+                </a:gridCol>
+                <a:gridCol w="3264730">
+                  <a:extLst>
+                    <a:ext uri="{9D8B030D-6E8A-4147-A177-3AD203B41FA5}">
+                      <a16:colId xmlns:a16="http://schemas.microsoft.com/office/drawing/2014/main" val="2503654453"/>
+                    </a:ext>
+                  </a:extLst>
+                </a:gridCol>
+              </a:tblGrid>
+              <a:tr h="412423">
+                <a:tc>
+                  <a:txBody>
+                    <a:bodyPr/>
+                    <a:lstStyle/>
+                    <a:p>
+                      <a:pPr latinLnBrk="1"/>
+                      <a:r>
+                        <a:rPr lang="ko-KR" altLang="en-US" dirty="0"/>
+                        <a:t>항목</a:t>
+                      </a:r>
+                    </a:p>
+                  </a:txBody>
+                  <a:tcPr>
+                    <a:lnL w="12700" cap="flat" cmpd="sng" algn="ctr">
+                      <a:noFill/>
+                      <a:prstDash val="solid"/>
+                      <a:round/>
+                      <a:headEnd type="none" w="med" len="med"/>
+                      <a:tailEnd type="none" w="med" len="med"/>
+                    </a:lnL>
+                    <a:lnR w="12700" cap="flat" cmpd="sng" algn="ctr">
+                      <a:solidFill>
+                        <a:schemeClr val="tx1"/>
+                      </a:solidFill>
+                      <a:prstDash val="solid"/>
+                      <a:round/>
+                      <a:headEnd type="none" w="med" len="med"/>
+                      <a:tailEnd type="none" w="med" len="med"/>
+                    </a:lnR>
+                    <a:lnT w="12700" cap="flat" cmpd="sng" algn="ctr">
+                      <a:solidFill>
+                        <a:schemeClr val="tx1"/>
+                      </a:solidFill>
+                      <a:prstDash val="solid"/>
+                      <a:round/>
+                      <a:headEnd type="none" w="med" len="med"/>
+                      <a:tailEnd type="none" w="med" len="med"/>
+                    </a:lnT>
+                    <a:lnB w="12700" cap="flat" cmpd="sng" algn="ctr">
+                      <a:solidFill>
+                        <a:schemeClr val="tx1"/>
+                      </a:solidFill>
+                      <a:prstDash val="solid"/>
+                      <a:round/>
+                      <a:headEnd type="none" w="med" len="med"/>
+                      <a:tailEnd type="none" w="med" len="med"/>
+                    </a:lnB>
+                    <a:solidFill>
+                      <a:schemeClr val="bg1"/>
+                    </a:solidFill>
+                  </a:tcPr>
+                </a:tc>
+                <a:tc>
+                  <a:txBody>
+                    <a:bodyPr/>
+                    <a:lstStyle/>
+                    <a:p>
+                      <a:pPr latinLnBrk="1"/>
+                      <a:r>
+                        <a:rPr lang="ko-KR" altLang="en-US" dirty="0"/>
+                        <a:t>예상 결과물</a:t>
+                      </a:r>
+                    </a:p>
+                  </a:txBody>
+                  <a:tcPr>
+                    <a:lnL w="12700" cap="flat" cmpd="sng" algn="ctr">
+                      <a:solidFill>
+                        <a:schemeClr val="tx1"/>
+                      </a:solidFill>
+                      <a:prstDash val="solid"/>
+                      <a:round/>
+                      <a:headEnd type="none" w="med" len="med"/>
+                      <a:tailEnd type="none" w="med" len="med"/>
+                    </a:lnL>
+                    <a:lnR w="12700" cap="flat" cmpd="sng" algn="ctr">
+                      <a:solidFill>
+                        <a:schemeClr val="tx1"/>
+                      </a:solidFill>
+                      <a:prstDash val="solid"/>
+                      <a:round/>
+                      <a:headEnd type="none" w="med" len="med"/>
+                      <a:tailEnd type="none" w="med" len="med"/>
+                    </a:lnR>
+                    <a:lnT w="12700" cap="flat" cmpd="sng" algn="ctr">
+                      <a:solidFill>
+                        <a:schemeClr val="tx1"/>
+                      </a:solidFill>
+                      <a:prstDash val="solid"/>
+                      <a:round/>
+                      <a:headEnd type="none" w="med" len="med"/>
+                      <a:tailEnd type="none" w="med" len="med"/>
+                    </a:lnT>
+                    <a:lnB w="12700" cap="flat" cmpd="sng" algn="ctr">
+                      <a:solidFill>
+                        <a:schemeClr val="tx1"/>
+                      </a:solidFill>
+                      <a:prstDash val="solid"/>
+                      <a:round/>
+                      <a:headEnd type="none" w="med" len="med"/>
+                      <a:tailEnd type="none" w="med" len="med"/>
+                    </a:lnB>
+                    <a:solidFill>
+                      <a:schemeClr val="bg1"/>
+                    </a:solidFill>
+                  </a:tcPr>
+                </a:tc>
+                <a:tc>
+                  <a:txBody>
+                    <a:bodyPr/>
+                    <a:lstStyle/>
+                    <a:p>
+                      <a:pPr latinLnBrk="1"/>
+                      <a:r>
+                        <a:rPr lang="ko-KR" altLang="en-US" dirty="0"/>
+                        <a:t>결과물에 대한 설명</a:t>
+                      </a:r>
+                    </a:p>
+                  </a:txBody>
+                  <a:tcPr>
+                    <a:lnL w="12700" cap="flat" cmpd="sng" algn="ctr">
+                      <a:solidFill>
+                        <a:schemeClr val="tx1"/>
+                      </a:solidFill>
+                      <a:prstDash val="solid"/>
+                      <a:round/>
+                      <a:headEnd type="none" w="med" len="med"/>
+                      <a:tailEnd type="none" w="med" len="med"/>
+                    </a:lnL>
+                    <a:lnR w="12700" cap="flat" cmpd="sng" algn="ctr">
+                      <a:noFill/>
+                      <a:prstDash val="solid"/>
+                      <a:round/>
+                      <a:headEnd type="none" w="med" len="med"/>
+                      <a:tailEnd type="none" w="med" len="med"/>
+                    </a:lnR>
+                    <a:lnT w="12700" cap="flat" cmpd="sng" algn="ctr">
+                      <a:solidFill>
+                        <a:schemeClr val="tx1"/>
+                      </a:solidFill>
+                      <a:prstDash val="solid"/>
+                      <a:round/>
+                      <a:headEnd type="none" w="med" len="med"/>
+                      <a:tailEnd type="none" w="med" len="med"/>
+                    </a:lnT>
+                    <a:lnB w="12700" cap="flat" cmpd="sng" algn="ctr">
+                      <a:solidFill>
+                        <a:schemeClr val="tx1"/>
+                      </a:solidFill>
+                      <a:prstDash val="solid"/>
+                      <a:round/>
+                      <a:headEnd type="none" w="med" len="med"/>
+                      <a:tailEnd type="none" w="med" len="med"/>
+                    </a:lnB>
+                    <a:solidFill>
+                      <a:schemeClr val="bg1"/>
+                    </a:solidFill>
+                  </a:tcPr>
+                </a:tc>
+                <a:extLst>
+                  <a:ext uri="{0D108BD9-81ED-4DB2-BD59-A6C34878D82A}">
+                    <a16:rowId xmlns:a16="http://schemas.microsoft.com/office/drawing/2014/main" val="2331627716"/>
+                  </a:ext>
+                </a:extLst>
+              </a:tr>
+              <a:tr h="721740">
+                <a:tc rowSpan="2">
+                  <a:txBody>
+                    <a:bodyPr/>
+                    <a:lstStyle/>
+                    <a:p>
+                      <a:pPr algn="ctr" latinLnBrk="1"/>
+                      <a:endParaRPr lang="en-US" altLang="ko-KR" sz="3200" dirty="0"/>
+                    </a:p>
+                    <a:p>
+                      <a:pPr algn="ctr" latinLnBrk="1"/>
+                      <a:r>
+                        <a:rPr lang="ko-KR" altLang="en-US" dirty="0"/>
+                        <a:t>설계</a:t>
+                      </a:r>
+                    </a:p>
+                  </a:txBody>
+                  <a:tcPr>
+                    <a:lnL w="12700" cap="flat" cmpd="sng" algn="ctr">
+                      <a:noFill/>
+                      <a:prstDash val="solid"/>
+                      <a:round/>
+                      <a:headEnd type="none" w="med" len="med"/>
+                      <a:tailEnd type="none" w="med" len="med"/>
+                    </a:lnL>
+                    <a:lnR w="12700" cap="flat" cmpd="sng" algn="ctr">
+                      <a:solidFill>
+                        <a:schemeClr val="tx1"/>
+                      </a:solidFill>
+                      <a:prstDash val="solid"/>
+                      <a:round/>
+                      <a:headEnd type="none" w="med" len="med"/>
+                      <a:tailEnd type="none" w="med" len="med"/>
+                    </a:lnR>
+                    <a:lnT w="12700" cap="flat" cmpd="sng" algn="ctr">
+                      <a:solidFill>
+                        <a:schemeClr val="tx1"/>
+                      </a:solidFill>
+                      <a:prstDash val="solid"/>
+                      <a:round/>
+                      <a:headEnd type="none" w="med" len="med"/>
+                      <a:tailEnd type="none" w="med" len="med"/>
+                    </a:lnT>
+                    <a:lnB w="12700" cap="flat" cmpd="sng" algn="ctr">
+                      <a:solidFill>
+                        <a:schemeClr val="tx1"/>
+                      </a:solidFill>
+                      <a:prstDash val="solid"/>
+                      <a:round/>
+                      <a:headEnd type="none" w="med" len="med"/>
+                      <a:tailEnd type="none" w="med" len="med"/>
+                    </a:lnB>
+                    <a:solidFill>
+                      <a:schemeClr val="bg1"/>
+                    </a:solidFill>
+                  </a:tcPr>
+                </a:tc>
+                <a:tc>
+                  <a:txBody>
+                    <a:bodyPr/>
+                    <a:lstStyle/>
+                    <a:p>
+                      <a:pPr latinLnBrk="1"/>
+                      <a:r>
+                        <a:rPr lang="ko-KR" altLang="en-US" dirty="0"/>
+                        <a:t>각종 센서와 탑재물을 장착한 </a:t>
+                      </a:r>
+                      <a:r>
+                        <a:rPr lang="ko-KR" altLang="en-US" dirty="0" err="1"/>
+                        <a:t>드론</a:t>
+                      </a:r>
+                      <a:endParaRPr lang="ko-KR" altLang="en-US" dirty="0"/>
+                    </a:p>
+                  </a:txBody>
+                  <a:tcPr>
+                    <a:lnL w="12700" cap="flat" cmpd="sng" algn="ctr">
+                      <a:solidFill>
+                        <a:schemeClr val="tx1"/>
+                      </a:solidFill>
+                      <a:prstDash val="solid"/>
+                      <a:round/>
+                      <a:headEnd type="none" w="med" len="med"/>
+                      <a:tailEnd type="none" w="med" len="med"/>
+                    </a:lnL>
+                    <a:lnR w="12700" cap="flat" cmpd="sng" algn="ctr">
+                      <a:solidFill>
+                        <a:schemeClr val="tx1"/>
+                      </a:solidFill>
+                      <a:prstDash val="solid"/>
+                      <a:round/>
+                      <a:headEnd type="none" w="med" len="med"/>
+                      <a:tailEnd type="none" w="med" len="med"/>
+                    </a:lnR>
+                    <a:lnT w="12700" cap="flat" cmpd="sng" algn="ctr">
+                      <a:solidFill>
+                        <a:schemeClr val="tx1"/>
+                      </a:solidFill>
+                      <a:prstDash val="solid"/>
+                      <a:round/>
+                      <a:headEnd type="none" w="med" len="med"/>
+                      <a:tailEnd type="none" w="med" len="med"/>
+                    </a:lnT>
+                    <a:lnB w="12700" cap="flat" cmpd="sng" algn="ctr">
+                      <a:solidFill>
+                        <a:schemeClr val="tx1"/>
+                      </a:solidFill>
+                      <a:prstDash val="solid"/>
+                      <a:round/>
+                      <a:headEnd type="none" w="med" len="med"/>
+                      <a:tailEnd type="none" w="med" len="med"/>
+                    </a:lnB>
+                    <a:solidFill>
+                      <a:schemeClr val="bg1"/>
+                    </a:solidFill>
+                  </a:tcPr>
+                </a:tc>
+                <a:tc>
+                  <a:txBody>
+                    <a:bodyPr/>
+                    <a:lstStyle/>
+                    <a:p>
+                      <a:pPr latinLnBrk="1"/>
+                      <a:r>
+                        <a:rPr lang="en-US" altLang="ko-KR" dirty="0"/>
+                        <a:t>CATIA</a:t>
+                      </a:r>
+                      <a:r>
+                        <a:rPr lang="ko-KR" altLang="en-US" dirty="0"/>
+                        <a:t>를 활용한 </a:t>
+                      </a:r>
+                      <a:r>
+                        <a:rPr lang="ko-KR" altLang="en-US" dirty="0" err="1"/>
+                        <a:t>드론과</a:t>
+                      </a:r>
+                      <a:r>
+                        <a:rPr lang="ko-KR" altLang="en-US" dirty="0"/>
+                        <a:t> </a:t>
+                      </a:r>
+                      <a:r>
+                        <a:rPr lang="ko-KR" altLang="en-US" dirty="0" err="1"/>
+                        <a:t>탑제체에</a:t>
+                      </a:r>
+                      <a:r>
+                        <a:rPr lang="ko-KR" altLang="en-US" dirty="0"/>
+                        <a:t> 대한 설계</a:t>
+                      </a:r>
+                    </a:p>
+                  </a:txBody>
+                  <a:tcPr>
+                    <a:lnL w="12700" cap="flat" cmpd="sng" algn="ctr">
+                      <a:solidFill>
+                        <a:schemeClr val="tx1"/>
+                      </a:solidFill>
+                      <a:prstDash val="solid"/>
+                      <a:round/>
+                      <a:headEnd type="none" w="med" len="med"/>
+                      <a:tailEnd type="none" w="med" len="med"/>
+                    </a:lnL>
+                    <a:lnR w="12700" cap="flat" cmpd="sng" algn="ctr">
+                      <a:noFill/>
+                      <a:prstDash val="solid"/>
+                      <a:round/>
+                      <a:headEnd type="none" w="med" len="med"/>
+                      <a:tailEnd type="none" w="med" len="med"/>
+                    </a:lnR>
+                    <a:lnT w="12700" cap="flat" cmpd="sng" algn="ctr">
+                      <a:solidFill>
+                        <a:schemeClr val="tx1"/>
+                      </a:solidFill>
+                      <a:prstDash val="solid"/>
+                      <a:round/>
+                      <a:headEnd type="none" w="med" len="med"/>
+                      <a:tailEnd type="none" w="med" len="med"/>
+                    </a:lnT>
+                    <a:lnB w="12700" cap="flat" cmpd="sng" algn="ctr">
+                      <a:solidFill>
+                        <a:schemeClr val="tx1"/>
+                      </a:solidFill>
+                      <a:prstDash val="solid"/>
+                      <a:round/>
+                      <a:headEnd type="none" w="med" len="med"/>
+                      <a:tailEnd type="none" w="med" len="med"/>
+                    </a:lnB>
+                    <a:solidFill>
+                      <a:schemeClr val="bg1"/>
+                    </a:solidFill>
+                  </a:tcPr>
+                </a:tc>
+                <a:extLst>
+                  <a:ext uri="{0D108BD9-81ED-4DB2-BD59-A6C34878D82A}">
+                    <a16:rowId xmlns:a16="http://schemas.microsoft.com/office/drawing/2014/main" val="2280300345"/>
+                  </a:ext>
+                </a:extLst>
+              </a:tr>
+              <a:tr h="721740">
+                <a:tc vMerge="1">
+                  <a:txBody>
+                    <a:bodyPr/>
+                    <a:lstStyle/>
+                    <a:p>
+                      <a:pPr latinLnBrk="1"/>
+                      <a:endParaRPr lang="ko-KR" altLang="en-US" dirty="0"/>
+                    </a:p>
+                  </a:txBody>
+                  <a:tcPr>
+                    <a:lnL w="12700" cap="flat" cmpd="sng" algn="ctr">
+                      <a:solidFill>
+                        <a:schemeClr val="tx1"/>
+                      </a:solidFill>
+                      <a:prstDash val="solid"/>
+                      <a:round/>
+                      <a:headEnd type="none" w="med" len="med"/>
+                      <a:tailEnd type="none" w="med" len="med"/>
+                    </a:lnL>
+                    <a:lnR w="12700" cap="flat" cmpd="sng" algn="ctr">
+                      <a:solidFill>
+                        <a:schemeClr val="tx1"/>
+                      </a:solidFill>
+                      <a:prstDash val="solid"/>
+                      <a:round/>
+                      <a:headEnd type="none" w="med" len="med"/>
+                      <a:tailEnd type="none" w="med" len="med"/>
+                    </a:lnR>
+                    <a:lnT w="12700" cap="flat" cmpd="sng" algn="ctr">
+                      <a:solidFill>
+                        <a:schemeClr val="tx1"/>
+                      </a:solidFill>
+                      <a:prstDash val="solid"/>
+                      <a:round/>
+                      <a:headEnd type="none" w="med" len="med"/>
+                      <a:tailEnd type="none" w="med" len="med"/>
+                    </a:lnT>
+                    <a:lnB w="12700" cap="flat" cmpd="sng" algn="ctr">
+                      <a:solidFill>
+                        <a:schemeClr val="tx1"/>
+                      </a:solidFill>
+                      <a:prstDash val="solid"/>
+                      <a:round/>
+                      <a:headEnd type="none" w="med" len="med"/>
+                      <a:tailEnd type="none" w="med" len="med"/>
+                    </a:lnB>
+                    <a:solidFill>
+                      <a:schemeClr val="bg1"/>
+                    </a:solidFill>
+                  </a:tcPr>
+                </a:tc>
+                <a:tc>
+                  <a:txBody>
+                    <a:bodyPr/>
+                    <a:lstStyle/>
+                    <a:p>
+                      <a:pPr latinLnBrk="1"/>
+                      <a:r>
+                        <a:rPr lang="ko-KR" altLang="en-US" dirty="0"/>
+                        <a:t>소프트웨어 아키텍처</a:t>
+                      </a:r>
+                      <a:r>
+                        <a:rPr lang="en-US" altLang="ko-KR" dirty="0"/>
+                        <a:t>, </a:t>
+                      </a:r>
+                      <a:r>
+                        <a:rPr lang="ko-KR" altLang="en-US" dirty="0"/>
+                        <a:t>구조도</a:t>
+                      </a:r>
+                    </a:p>
+                  </a:txBody>
+                  <a:tcPr>
+                    <a:lnL w="12700" cap="flat" cmpd="sng" algn="ctr">
+                      <a:solidFill>
+                        <a:schemeClr val="tx1"/>
+                      </a:solidFill>
+                      <a:prstDash val="solid"/>
+                      <a:round/>
+                      <a:headEnd type="none" w="med" len="med"/>
+                      <a:tailEnd type="none" w="med" len="med"/>
+                    </a:lnL>
+                    <a:lnR w="12700" cap="flat" cmpd="sng" algn="ctr">
+                      <a:solidFill>
+                        <a:schemeClr val="tx1"/>
+                      </a:solidFill>
+                      <a:prstDash val="solid"/>
+                      <a:round/>
+                      <a:headEnd type="none" w="med" len="med"/>
+                      <a:tailEnd type="none" w="med" len="med"/>
+                    </a:lnR>
+                    <a:lnT w="12700" cap="flat" cmpd="sng" algn="ctr">
+                      <a:solidFill>
+                        <a:schemeClr val="tx1"/>
+                      </a:solidFill>
+                      <a:prstDash val="solid"/>
+                      <a:round/>
+                      <a:headEnd type="none" w="med" len="med"/>
+                      <a:tailEnd type="none" w="med" len="med"/>
+                    </a:lnT>
+                    <a:lnB w="12700" cap="flat" cmpd="sng" algn="ctr">
+                      <a:solidFill>
+                        <a:schemeClr val="tx1"/>
+                      </a:solidFill>
+                      <a:prstDash val="solid"/>
+                      <a:round/>
+                      <a:headEnd type="none" w="med" len="med"/>
+                      <a:tailEnd type="none" w="med" len="med"/>
+                    </a:lnB>
+                    <a:solidFill>
+                      <a:schemeClr val="bg1"/>
+                    </a:solidFill>
+                  </a:tcPr>
+                </a:tc>
+                <a:tc>
+                  <a:txBody>
+                    <a:bodyPr/>
+                    <a:lstStyle/>
+                    <a:p>
+                      <a:pPr latinLnBrk="1"/>
+                      <a:r>
+                        <a:rPr lang="ko-KR" altLang="en-US" dirty="0" err="1"/>
+                        <a:t>소프트웨어어</a:t>
+                      </a:r>
+                      <a:r>
+                        <a:rPr lang="ko-KR" altLang="en-US" dirty="0"/>
+                        <a:t> 구조도를 작성한다</a:t>
+                      </a:r>
+                    </a:p>
+                  </a:txBody>
+                  <a:tcPr>
+                    <a:lnL w="12700" cap="flat" cmpd="sng" algn="ctr">
+                      <a:solidFill>
+                        <a:schemeClr val="tx1"/>
+                      </a:solidFill>
+                      <a:prstDash val="solid"/>
+                      <a:round/>
+                      <a:headEnd type="none" w="med" len="med"/>
+                      <a:tailEnd type="none" w="med" len="med"/>
+                    </a:lnL>
+                    <a:lnR w="12700" cap="flat" cmpd="sng" algn="ctr">
+                      <a:noFill/>
+                      <a:prstDash val="solid"/>
+                      <a:round/>
+                      <a:headEnd type="none" w="med" len="med"/>
+                      <a:tailEnd type="none" w="med" len="med"/>
+                    </a:lnR>
+                    <a:lnT w="12700" cap="flat" cmpd="sng" algn="ctr">
+                      <a:solidFill>
+                        <a:schemeClr val="tx1"/>
+                      </a:solidFill>
+                      <a:prstDash val="solid"/>
+                      <a:round/>
+                      <a:headEnd type="none" w="med" len="med"/>
+                      <a:tailEnd type="none" w="med" len="med"/>
+                    </a:lnT>
+                    <a:lnB w="12700" cap="flat" cmpd="sng" algn="ctr">
+                      <a:solidFill>
+                        <a:schemeClr val="tx1"/>
+                      </a:solidFill>
+                      <a:prstDash val="solid"/>
+                      <a:round/>
+                      <a:headEnd type="none" w="med" len="med"/>
+                      <a:tailEnd type="none" w="med" len="med"/>
+                    </a:lnB>
+                    <a:solidFill>
+                      <a:schemeClr val="bg1"/>
+                    </a:solidFill>
+                  </a:tcPr>
+                </a:tc>
+                <a:extLst>
+                  <a:ext uri="{0D108BD9-81ED-4DB2-BD59-A6C34878D82A}">
+                    <a16:rowId xmlns:a16="http://schemas.microsoft.com/office/drawing/2014/main" val="2378290198"/>
+                  </a:ext>
+                </a:extLst>
+              </a:tr>
+              <a:tr h="1031057">
+                <a:tc>
+                  <a:txBody>
+                    <a:bodyPr/>
+                    <a:lstStyle/>
+                    <a:p>
+                      <a:pPr algn="ctr" latinLnBrk="1"/>
+                      <a:endParaRPr lang="en-US" altLang="ko-KR" dirty="0"/>
+                    </a:p>
+                    <a:p>
+                      <a:pPr algn="ctr" latinLnBrk="1"/>
+                      <a:r>
+                        <a:rPr lang="ko-KR" altLang="en-US" dirty="0"/>
+                        <a:t>수학적 분석</a:t>
+                      </a:r>
+                    </a:p>
+                  </a:txBody>
+                  <a:tcPr>
+                    <a:lnL w="12700" cap="flat" cmpd="sng" algn="ctr">
+                      <a:noFill/>
+                      <a:prstDash val="solid"/>
+                      <a:round/>
+                      <a:headEnd type="none" w="med" len="med"/>
+                      <a:tailEnd type="none" w="med" len="med"/>
+                    </a:lnL>
+                    <a:lnR w="12700" cap="flat" cmpd="sng" algn="ctr">
+                      <a:solidFill>
+                        <a:schemeClr val="tx1"/>
+                      </a:solidFill>
+                      <a:prstDash val="solid"/>
+                      <a:round/>
+                      <a:headEnd type="none" w="med" len="med"/>
+                      <a:tailEnd type="none" w="med" len="med"/>
+                    </a:lnR>
+                    <a:lnT w="12700" cap="flat" cmpd="sng" algn="ctr">
+                      <a:solidFill>
+                        <a:schemeClr val="tx1"/>
+                      </a:solidFill>
+                      <a:prstDash val="solid"/>
+                      <a:round/>
+                      <a:headEnd type="none" w="med" len="med"/>
+                      <a:tailEnd type="none" w="med" len="med"/>
+                    </a:lnT>
+                    <a:lnB w="12700" cap="flat" cmpd="sng" algn="ctr">
+                      <a:solidFill>
+                        <a:schemeClr val="tx1"/>
+                      </a:solidFill>
+                      <a:prstDash val="solid"/>
+                      <a:round/>
+                      <a:headEnd type="none" w="med" len="med"/>
+                      <a:tailEnd type="none" w="med" len="med"/>
+                    </a:lnB>
+                    <a:solidFill>
+                      <a:schemeClr val="bg1"/>
+                    </a:solidFill>
+                  </a:tcPr>
+                </a:tc>
+                <a:tc>
+                  <a:txBody>
+                    <a:bodyPr/>
+                    <a:lstStyle/>
+                    <a:p>
+                      <a:pPr latinLnBrk="1"/>
+                      <a:r>
+                        <a:rPr lang="ko-KR" altLang="en-US" dirty="0" err="1"/>
+                        <a:t>드론의</a:t>
+                      </a:r>
+                      <a:r>
+                        <a:rPr lang="ko-KR" altLang="en-US" dirty="0"/>
+                        <a:t> 비행 유무 분석</a:t>
+                      </a:r>
+                    </a:p>
+                  </a:txBody>
+                  <a:tcPr>
+                    <a:lnL w="12700" cap="flat" cmpd="sng" algn="ctr">
+                      <a:solidFill>
+                        <a:schemeClr val="tx1"/>
+                      </a:solidFill>
+                      <a:prstDash val="solid"/>
+                      <a:round/>
+                      <a:headEnd type="none" w="med" len="med"/>
+                      <a:tailEnd type="none" w="med" len="med"/>
+                    </a:lnL>
+                    <a:lnR w="12700" cap="flat" cmpd="sng" algn="ctr">
+                      <a:solidFill>
+                        <a:schemeClr val="tx1"/>
+                      </a:solidFill>
+                      <a:prstDash val="solid"/>
+                      <a:round/>
+                      <a:headEnd type="none" w="med" len="med"/>
+                      <a:tailEnd type="none" w="med" len="med"/>
+                    </a:lnR>
+                    <a:lnT w="12700" cap="flat" cmpd="sng" algn="ctr">
+                      <a:solidFill>
+                        <a:schemeClr val="tx1"/>
+                      </a:solidFill>
+                      <a:prstDash val="solid"/>
+                      <a:round/>
+                      <a:headEnd type="none" w="med" len="med"/>
+                      <a:tailEnd type="none" w="med" len="med"/>
+                    </a:lnT>
+                    <a:lnB w="12700" cap="flat" cmpd="sng" algn="ctr">
+                      <a:solidFill>
+                        <a:schemeClr val="tx1"/>
+                      </a:solidFill>
+                      <a:prstDash val="solid"/>
+                      <a:round/>
+                      <a:headEnd type="none" w="med" len="med"/>
+                      <a:tailEnd type="none" w="med" len="med"/>
+                    </a:lnB>
+                    <a:solidFill>
+                      <a:schemeClr val="bg1"/>
+                    </a:solidFill>
+                  </a:tcPr>
+                </a:tc>
+                <a:tc>
+                  <a:txBody>
+                    <a:bodyPr/>
+                    <a:lstStyle/>
+                    <a:p>
+                      <a:pPr latinLnBrk="1"/>
+                      <a:r>
+                        <a:rPr lang="ko-KR" altLang="en-US" dirty="0" err="1"/>
+                        <a:t>드론</a:t>
+                      </a:r>
+                      <a:r>
+                        <a:rPr lang="ko-KR" altLang="en-US" dirty="0"/>
+                        <a:t> 자체 중량과 페이로드 값을 계산하여 비행 유무를 계산한다</a:t>
+                      </a:r>
+                    </a:p>
+                  </a:txBody>
+                  <a:tcPr>
+                    <a:lnL w="12700" cap="flat" cmpd="sng" algn="ctr">
+                      <a:solidFill>
+                        <a:schemeClr val="tx1"/>
+                      </a:solidFill>
+                      <a:prstDash val="solid"/>
+                      <a:round/>
+                      <a:headEnd type="none" w="med" len="med"/>
+                      <a:tailEnd type="none" w="med" len="med"/>
+                    </a:lnL>
+                    <a:lnR w="12700" cap="flat" cmpd="sng" algn="ctr">
+                      <a:noFill/>
+                      <a:prstDash val="solid"/>
+                      <a:round/>
+                      <a:headEnd type="none" w="med" len="med"/>
+                      <a:tailEnd type="none" w="med" len="med"/>
+                    </a:lnR>
+                    <a:lnT w="12700" cap="flat" cmpd="sng" algn="ctr">
+                      <a:solidFill>
+                        <a:schemeClr val="tx1"/>
+                      </a:solidFill>
+                      <a:prstDash val="solid"/>
+                      <a:round/>
+                      <a:headEnd type="none" w="med" len="med"/>
+                      <a:tailEnd type="none" w="med" len="med"/>
+                    </a:lnT>
+                    <a:lnB w="12700" cap="flat" cmpd="sng" algn="ctr">
+                      <a:solidFill>
+                        <a:schemeClr val="tx1"/>
+                      </a:solidFill>
+                      <a:prstDash val="solid"/>
+                      <a:round/>
+                      <a:headEnd type="none" w="med" len="med"/>
+                      <a:tailEnd type="none" w="med" len="med"/>
+                    </a:lnB>
+                    <a:solidFill>
+                      <a:schemeClr val="bg1"/>
+                    </a:solidFill>
+                  </a:tcPr>
+                </a:tc>
+                <a:extLst>
+                  <a:ext uri="{0D108BD9-81ED-4DB2-BD59-A6C34878D82A}">
+                    <a16:rowId xmlns:a16="http://schemas.microsoft.com/office/drawing/2014/main" val="2209411325"/>
+                  </a:ext>
+                </a:extLst>
+              </a:tr>
+              <a:tr h="1031057">
+                <a:tc>
+                  <a:txBody>
+                    <a:bodyPr/>
+                    <a:lstStyle/>
+                    <a:p>
+                      <a:pPr algn="ctr" latinLnBrk="1"/>
+                      <a:endParaRPr lang="en-US" altLang="ko-KR" dirty="0"/>
+                    </a:p>
+                    <a:p>
+                      <a:pPr algn="ctr" latinLnBrk="1"/>
+                      <a:r>
+                        <a:rPr lang="ko-KR" altLang="en-US" dirty="0"/>
+                        <a:t>시뮬레이션</a:t>
+                      </a:r>
+                    </a:p>
+                  </a:txBody>
+                  <a:tcPr>
+                    <a:lnL w="12700" cap="flat" cmpd="sng" algn="ctr">
+                      <a:noFill/>
+                      <a:prstDash val="solid"/>
+                      <a:round/>
+                      <a:headEnd type="none" w="med" len="med"/>
+                      <a:tailEnd type="none" w="med" len="med"/>
+                    </a:lnL>
+                    <a:lnR w="12700" cap="flat" cmpd="sng" algn="ctr">
+                      <a:solidFill>
+                        <a:schemeClr val="tx1"/>
+                      </a:solidFill>
+                      <a:prstDash val="solid"/>
+                      <a:round/>
+                      <a:headEnd type="none" w="med" len="med"/>
+                      <a:tailEnd type="none" w="med" len="med"/>
+                    </a:lnR>
+                    <a:lnT w="12700" cap="flat" cmpd="sng" algn="ctr">
+                      <a:solidFill>
+                        <a:schemeClr val="tx1"/>
+                      </a:solidFill>
+                      <a:prstDash val="solid"/>
+                      <a:round/>
+                      <a:headEnd type="none" w="med" len="med"/>
+                      <a:tailEnd type="none" w="med" len="med"/>
+                    </a:lnT>
+                    <a:lnB w="12700" cap="flat" cmpd="sng" algn="ctr">
+                      <a:solidFill>
+                        <a:schemeClr val="tx1"/>
+                      </a:solidFill>
+                      <a:prstDash val="solid"/>
+                      <a:round/>
+                      <a:headEnd type="none" w="med" len="med"/>
+                      <a:tailEnd type="none" w="med" len="med"/>
+                    </a:lnB>
+                    <a:solidFill>
+                      <a:schemeClr val="bg1"/>
+                    </a:solidFill>
+                  </a:tcPr>
+                </a:tc>
+                <a:tc>
+                  <a:txBody>
+                    <a:bodyPr/>
+                    <a:lstStyle/>
+                    <a:p>
+                      <a:pPr latinLnBrk="1"/>
+                      <a:r>
+                        <a:rPr lang="en-US" altLang="ko-KR" dirty="0"/>
+                        <a:t>ROS</a:t>
+                      </a:r>
+                      <a:r>
+                        <a:rPr lang="ko-KR" altLang="en-US" dirty="0"/>
+                        <a:t>와 </a:t>
+                      </a:r>
+                      <a:r>
+                        <a:rPr lang="en-US" altLang="ko-KR" dirty="0"/>
+                        <a:t>Gazebo Simulator</a:t>
+                      </a:r>
+                      <a:r>
+                        <a:rPr lang="ko-KR" altLang="en-US" dirty="0"/>
+                        <a:t>를 이용한 비행 테스트</a:t>
+                      </a:r>
+                    </a:p>
+                  </a:txBody>
+                  <a:tcPr>
+                    <a:lnL w="12700" cap="flat" cmpd="sng" algn="ctr">
+                      <a:solidFill>
+                        <a:schemeClr val="tx1"/>
+                      </a:solidFill>
+                      <a:prstDash val="solid"/>
+                      <a:round/>
+                      <a:headEnd type="none" w="med" len="med"/>
+                      <a:tailEnd type="none" w="med" len="med"/>
+                    </a:lnL>
+                    <a:lnR w="12700" cap="flat" cmpd="sng" algn="ctr">
+                      <a:solidFill>
+                        <a:schemeClr val="tx1"/>
+                      </a:solidFill>
+                      <a:prstDash val="solid"/>
+                      <a:round/>
+                      <a:headEnd type="none" w="med" len="med"/>
+                      <a:tailEnd type="none" w="med" len="med"/>
+                    </a:lnR>
+                    <a:lnT w="12700" cap="flat" cmpd="sng" algn="ctr">
+                      <a:solidFill>
+                        <a:schemeClr val="tx1"/>
+                      </a:solidFill>
+                      <a:prstDash val="solid"/>
+                      <a:round/>
+                      <a:headEnd type="none" w="med" len="med"/>
+                      <a:tailEnd type="none" w="med" len="med"/>
+                    </a:lnT>
+                    <a:lnB w="12700" cap="flat" cmpd="sng" algn="ctr">
+                      <a:solidFill>
+                        <a:schemeClr val="tx1"/>
+                      </a:solidFill>
+                      <a:prstDash val="solid"/>
+                      <a:round/>
+                      <a:headEnd type="none" w="med" len="med"/>
+                      <a:tailEnd type="none" w="med" len="med"/>
+                    </a:lnB>
+                    <a:solidFill>
+                      <a:schemeClr val="bg1"/>
+                    </a:solidFill>
+                  </a:tcPr>
+                </a:tc>
+                <a:tc>
+                  <a:txBody>
+                    <a:bodyPr/>
+                    <a:lstStyle/>
+                    <a:p>
+                      <a:pPr latinLnBrk="1"/>
+                      <a:r>
+                        <a:rPr lang="ko-KR" altLang="en-US" dirty="0"/>
+                        <a:t>실제 </a:t>
+                      </a:r>
+                      <a:r>
+                        <a:rPr lang="ko-KR" altLang="en-US" dirty="0" err="1"/>
+                        <a:t>드론</a:t>
+                      </a:r>
+                      <a:r>
+                        <a:rPr lang="ko-KR" altLang="en-US" dirty="0"/>
+                        <a:t> </a:t>
+                      </a:r>
+                      <a:r>
+                        <a:rPr lang="ko-KR" altLang="en-US" dirty="0" err="1"/>
+                        <a:t>비행전</a:t>
+                      </a:r>
+                      <a:r>
+                        <a:rPr lang="ko-KR" altLang="en-US" dirty="0"/>
+                        <a:t> 지형과 탑재물을 장착한 </a:t>
+                      </a:r>
+                      <a:r>
+                        <a:rPr lang="ko-KR" altLang="en-US" dirty="0" err="1"/>
+                        <a:t>드론을</a:t>
+                      </a:r>
+                      <a:r>
+                        <a:rPr lang="ko-KR" altLang="en-US" dirty="0"/>
+                        <a:t> 시뮬레이션해 본다</a:t>
+                      </a:r>
+                    </a:p>
+                  </a:txBody>
+                  <a:tcPr>
+                    <a:lnL w="12700" cap="flat" cmpd="sng" algn="ctr">
+                      <a:solidFill>
+                        <a:schemeClr val="tx1"/>
+                      </a:solidFill>
+                      <a:prstDash val="solid"/>
+                      <a:round/>
+                      <a:headEnd type="none" w="med" len="med"/>
+                      <a:tailEnd type="none" w="med" len="med"/>
+                    </a:lnL>
+                    <a:lnR w="12700" cap="flat" cmpd="sng" algn="ctr">
+                      <a:noFill/>
+                      <a:prstDash val="solid"/>
+                      <a:round/>
+                      <a:headEnd type="none" w="med" len="med"/>
+                      <a:tailEnd type="none" w="med" len="med"/>
+                    </a:lnR>
+                    <a:lnT w="12700" cap="flat" cmpd="sng" algn="ctr">
+                      <a:solidFill>
+                        <a:schemeClr val="tx1"/>
+                      </a:solidFill>
+                      <a:prstDash val="solid"/>
+                      <a:round/>
+                      <a:headEnd type="none" w="med" len="med"/>
+                      <a:tailEnd type="none" w="med" len="med"/>
+                    </a:lnT>
+                    <a:lnB w="12700" cap="flat" cmpd="sng" algn="ctr">
+                      <a:solidFill>
+                        <a:schemeClr val="tx1"/>
+                      </a:solidFill>
+                      <a:prstDash val="solid"/>
+                      <a:round/>
+                      <a:headEnd type="none" w="med" len="med"/>
+                      <a:tailEnd type="none" w="med" len="med"/>
+                    </a:lnB>
+                    <a:solidFill>
+                      <a:schemeClr val="bg1"/>
+                    </a:solidFill>
+                  </a:tcPr>
+                </a:tc>
+                <a:extLst>
+                  <a:ext uri="{0D108BD9-81ED-4DB2-BD59-A6C34878D82A}">
+                    <a16:rowId xmlns:a16="http://schemas.microsoft.com/office/drawing/2014/main" val="3299703564"/>
+                  </a:ext>
+                </a:extLst>
+              </a:tr>
+              <a:tr h="1031057">
+                <a:tc>
+                  <a:txBody>
+                    <a:bodyPr/>
+                    <a:lstStyle/>
+                    <a:p>
+                      <a:pPr algn="ctr" latinLnBrk="1"/>
+                      <a:endParaRPr lang="en-US" altLang="ko-KR" dirty="0"/>
+                    </a:p>
+                    <a:p>
+                      <a:pPr algn="ctr" latinLnBrk="1"/>
+                      <a:r>
+                        <a:rPr lang="ko-KR" altLang="en-US" dirty="0"/>
+                        <a:t>실험 및 제작</a:t>
+                      </a:r>
+                    </a:p>
+                  </a:txBody>
+                  <a:tcPr>
+                    <a:lnL w="12700" cap="flat" cmpd="sng" algn="ctr">
+                      <a:noFill/>
+                      <a:prstDash val="solid"/>
+                      <a:round/>
+                      <a:headEnd type="none" w="med" len="med"/>
+                      <a:tailEnd type="none" w="med" len="med"/>
+                    </a:lnL>
+                    <a:lnR w="12700" cap="flat" cmpd="sng" algn="ctr">
+                      <a:solidFill>
+                        <a:schemeClr val="tx1"/>
+                      </a:solidFill>
+                      <a:prstDash val="solid"/>
+                      <a:round/>
+                      <a:headEnd type="none" w="med" len="med"/>
+                      <a:tailEnd type="none" w="med" len="med"/>
+                    </a:lnR>
+                    <a:lnT w="12700" cap="flat" cmpd="sng" algn="ctr">
+                      <a:solidFill>
+                        <a:schemeClr val="tx1"/>
+                      </a:solidFill>
+                      <a:prstDash val="solid"/>
+                      <a:round/>
+                      <a:headEnd type="none" w="med" len="med"/>
+                      <a:tailEnd type="none" w="med" len="med"/>
+                    </a:lnT>
+                    <a:lnB w="12700" cap="flat" cmpd="sng" algn="ctr">
+                      <a:solidFill>
+                        <a:schemeClr val="tx1"/>
+                      </a:solidFill>
+                      <a:prstDash val="solid"/>
+                      <a:round/>
+                      <a:headEnd type="none" w="med" len="med"/>
+                      <a:tailEnd type="none" w="med" len="med"/>
+                    </a:lnB>
+                    <a:solidFill>
+                      <a:schemeClr val="bg1"/>
+                    </a:solidFill>
+                  </a:tcPr>
+                </a:tc>
+                <a:tc>
+                  <a:txBody>
+                    <a:bodyPr/>
+                    <a:lstStyle/>
+                    <a:p>
+                      <a:pPr latinLnBrk="1"/>
+                      <a:r>
+                        <a:rPr lang="ko-KR" altLang="en-US" dirty="0" err="1"/>
+                        <a:t>드론에</a:t>
+                      </a:r>
+                      <a:r>
+                        <a:rPr lang="ko-KR" altLang="en-US" dirty="0"/>
+                        <a:t> 장착물을 </a:t>
+                      </a:r>
+                      <a:r>
+                        <a:rPr lang="ko-KR" altLang="en-US" dirty="0" err="1"/>
+                        <a:t>장착후</a:t>
+                      </a:r>
+                      <a:r>
+                        <a:rPr lang="ko-KR" altLang="en-US" dirty="0"/>
+                        <a:t> 테스트</a:t>
+                      </a:r>
+                    </a:p>
+                  </a:txBody>
+                  <a:tcPr>
+                    <a:lnL w="12700" cap="flat" cmpd="sng" algn="ctr">
+                      <a:solidFill>
+                        <a:schemeClr val="tx1"/>
+                      </a:solidFill>
+                      <a:prstDash val="solid"/>
+                      <a:round/>
+                      <a:headEnd type="none" w="med" len="med"/>
+                      <a:tailEnd type="none" w="med" len="med"/>
+                    </a:lnL>
+                    <a:lnR w="12700" cap="flat" cmpd="sng" algn="ctr">
+                      <a:solidFill>
+                        <a:schemeClr val="tx1"/>
+                      </a:solidFill>
+                      <a:prstDash val="solid"/>
+                      <a:round/>
+                      <a:headEnd type="none" w="med" len="med"/>
+                      <a:tailEnd type="none" w="med" len="med"/>
+                    </a:lnR>
+                    <a:lnT w="12700" cap="flat" cmpd="sng" algn="ctr">
+                      <a:solidFill>
+                        <a:schemeClr val="tx1"/>
+                      </a:solidFill>
+                      <a:prstDash val="solid"/>
+                      <a:round/>
+                      <a:headEnd type="none" w="med" len="med"/>
+                      <a:tailEnd type="none" w="med" len="med"/>
+                    </a:lnT>
+                    <a:lnB w="12700" cap="flat" cmpd="sng" algn="ctr">
+                      <a:solidFill>
+                        <a:schemeClr val="tx1"/>
+                      </a:solidFill>
+                      <a:prstDash val="solid"/>
+                      <a:round/>
+                      <a:headEnd type="none" w="med" len="med"/>
+                      <a:tailEnd type="none" w="med" len="med"/>
+                    </a:lnB>
+                    <a:solidFill>
+                      <a:schemeClr val="bg1"/>
+                    </a:solidFill>
+                  </a:tcPr>
+                </a:tc>
+                <a:tc>
+                  <a:txBody>
+                    <a:bodyPr/>
+                    <a:lstStyle/>
+                    <a:p>
+                      <a:pPr latinLnBrk="1"/>
+                      <a:r>
+                        <a:rPr lang="ko-KR" altLang="en-US" dirty="0"/>
+                        <a:t>소프트웨어를 탑재하고 장착물을 탑제한후 실제 비행 테스트를 진행한다</a:t>
+                      </a:r>
+                    </a:p>
+                  </a:txBody>
+                  <a:tcPr>
+                    <a:lnL w="12700" cap="flat" cmpd="sng" algn="ctr">
+                      <a:solidFill>
+                        <a:schemeClr val="tx1"/>
+                      </a:solidFill>
+                      <a:prstDash val="solid"/>
+                      <a:round/>
+                      <a:headEnd type="none" w="med" len="med"/>
+                      <a:tailEnd type="none" w="med" len="med"/>
+                    </a:lnL>
+                    <a:lnR w="12700" cap="flat" cmpd="sng" algn="ctr">
+                      <a:noFill/>
+                      <a:prstDash val="solid"/>
+                      <a:round/>
+                      <a:headEnd type="none" w="med" len="med"/>
+                      <a:tailEnd type="none" w="med" len="med"/>
+                    </a:lnR>
+                    <a:lnT w="12700" cap="flat" cmpd="sng" algn="ctr">
+                      <a:solidFill>
+                        <a:schemeClr val="tx1"/>
+                      </a:solidFill>
+                      <a:prstDash val="solid"/>
+                      <a:round/>
+                      <a:headEnd type="none" w="med" len="med"/>
+                      <a:tailEnd type="none" w="med" len="med"/>
+                    </a:lnT>
+                    <a:lnB w="12700" cap="flat" cmpd="sng" algn="ctr">
+                      <a:solidFill>
+                        <a:schemeClr val="tx1"/>
+                      </a:solidFill>
+                      <a:prstDash val="solid"/>
+                      <a:round/>
+                      <a:headEnd type="none" w="med" len="med"/>
+                      <a:tailEnd type="none" w="med" len="med"/>
+                    </a:lnB>
+                    <a:solidFill>
+                      <a:schemeClr val="bg1"/>
+                    </a:solidFill>
+                  </a:tcPr>
+                </a:tc>
+                <a:extLst>
+                  <a:ext uri="{0D108BD9-81ED-4DB2-BD59-A6C34878D82A}">
+                    <a16:rowId xmlns:a16="http://schemas.microsoft.com/office/drawing/2014/main" val="3714975863"/>
+                  </a:ext>
+                </a:extLst>
+              </a:tr>
+            </a:tbl>
+          </a:graphicData>
+        </a:graphic>
+      </p:graphicFrame>
+    </p:spTree>
+    <p:extLst>
+      <p:ext uri="{BB962C8B-B14F-4D97-AF65-F5344CB8AC3E}">
+        <p14:creationId xmlns:p14="http://schemas.microsoft.com/office/powerpoint/2010/main" val="4248988520"/>
+      </p:ext>
+    </p:extLst>
+  </p:cSld>
+  <p:clrMapOvr>
+    <a:masterClrMapping/>
+  </p:clrMapOvr>
+</p:sld>
+</file>
+
+<file path=ppt/slides/slide12.xml><?xml version="1.0" encoding="utf-8"?>
+<p:sld xmlns:a="http://schemas.openxmlformats.org/drawingml/2006/main" xmlns:r="http://schemas.openxmlformats.org/officeDocument/2006/relationships" xmlns:p="http://schemas.openxmlformats.org/presentationml/2006/main">
+  <p:cSld>
+    <p:spTree>
+      <p:nvGrpSpPr>
+        <p:cNvPr id="1" name=""/>
+        <p:cNvGrpSpPr/>
+        <p:nvPr/>
+      </p:nvGrpSpPr>
+      <p:grpSpPr>
+        <a:xfrm>
+          <a:off x="0" y="0"/>
+          <a:ext cx="0" cy="0"/>
+          <a:chOff x="0" y="0"/>
+          <a:chExt cx="0" cy="0"/>
+        </a:xfrm>
+      </p:grpSpPr>
+      <p:sp>
+        <p:nvSpPr>
+          <p:cNvPr id="2" name="제목 1">
+            <a:extLst>
+              <a:ext uri="{FF2B5EF4-FFF2-40B4-BE49-F238E27FC236}">
+                <a16:creationId xmlns:a16="http://schemas.microsoft.com/office/drawing/2014/main" id="{0423823E-CA6D-0DFA-4403-A7FC715FD5E2}"/>
+              </a:ext>
+            </a:extLst>
+          </p:cNvPr>
+          <p:cNvSpPr>
+            <a:spLocks noGrp="1"/>
+          </p:cNvSpPr>
+          <p:nvPr>
+            <p:ph type="title"/>
+          </p:nvPr>
+        </p:nvSpPr>
+        <p:spPr>
+          <a:xfrm>
+            <a:off x="457200" y="177864"/>
+            <a:ext cx="10515600" cy="1325563"/>
+          </a:xfrm>
+        </p:spPr>
+        <p:txBody>
+          <a:bodyPr/>
+          <a:lstStyle/>
+          <a:p>
+            <a:r>
+              <a:rPr lang="ko-KR" altLang="en-US" dirty="0">
+                <a:solidFill>
+                  <a:srgbClr val="3679A4"/>
+                </a:solidFill>
+                <a:latin typeface="에스코어 드림 9 Black" panose="020B0A03030302020204" pitchFamily="34" charset="-127"/>
+                <a:ea typeface="에스코어 드림 9 Black" panose="020B0A03030302020204" pitchFamily="34" charset="-127"/>
+              </a:rPr>
+              <a:t>기대 </a:t>
+            </a:r>
+            <a:r>
+              <a:rPr lang="ko-KR" altLang="en-US" dirty="0">
+                <a:solidFill>
+                  <a:srgbClr val="F56D6D"/>
+                </a:solidFill>
+                <a:latin typeface="에스코어 드림 9 Black" panose="020B0A03030302020204" pitchFamily="34" charset="-127"/>
+                <a:ea typeface="에스코어 드림 9 Black" panose="020B0A03030302020204" pitchFamily="34" charset="-127"/>
+              </a:rPr>
+              <a:t>효과</a:t>
+            </a:r>
+          </a:p>
+        </p:txBody>
+      </p:sp>
+      <p:sp>
+        <p:nvSpPr>
+          <p:cNvPr id="3" name="TextBox 2">
+            <a:extLst>
+              <a:ext uri="{FF2B5EF4-FFF2-40B4-BE49-F238E27FC236}">
+                <a16:creationId xmlns:a16="http://schemas.microsoft.com/office/drawing/2014/main" id="{7EFC95EE-4BFD-6470-D2ED-CD234BFA812C}"/>
+              </a:ext>
+            </a:extLst>
+          </p:cNvPr>
+          <p:cNvSpPr txBox="1"/>
+          <p:nvPr/>
+        </p:nvSpPr>
+        <p:spPr>
+          <a:xfrm>
+            <a:off x="2036190" y="2234153"/>
+            <a:ext cx="5731497" cy="2308324"/>
+          </a:xfrm>
+          <a:prstGeom prst="rect">
+            <a:avLst/>
+          </a:prstGeom>
+          <a:noFill/>
+        </p:spPr>
+        <p:txBody>
+          <a:bodyPr wrap="square" rtlCol="0">
+            <a:spAutoFit/>
+          </a:bodyPr>
+          <a:lstStyle/>
+          <a:p>
+            <a:r>
+              <a:rPr lang="ko-KR" altLang="en-US" dirty="0"/>
+              <a:t>신속한 이동</a:t>
+            </a:r>
+            <a:endParaRPr lang="en-US" altLang="ko-KR" dirty="0"/>
+          </a:p>
+          <a:p>
+            <a:endParaRPr lang="en-US" altLang="ko-KR" dirty="0"/>
+          </a:p>
+          <a:p>
+            <a:r>
+              <a:rPr lang="ko-KR" altLang="en-US" dirty="0"/>
+              <a:t>경찰 위험 감소</a:t>
+            </a:r>
+            <a:endParaRPr lang="en-US" altLang="ko-KR" dirty="0"/>
+          </a:p>
+          <a:p>
+            <a:endParaRPr lang="en-US" altLang="ko-KR" dirty="0"/>
+          </a:p>
+          <a:p>
+            <a:r>
+              <a:rPr lang="ko-KR" altLang="en-US" dirty="0"/>
+              <a:t>긴급차량의 사고 감소</a:t>
+            </a:r>
+            <a:endParaRPr lang="en-US" altLang="ko-KR" dirty="0"/>
+          </a:p>
+          <a:p>
+            <a:endParaRPr lang="en-US" altLang="ko-KR" dirty="0"/>
+          </a:p>
+          <a:p>
+            <a:r>
+              <a:rPr lang="ko-KR" altLang="en-US" dirty="0"/>
+              <a:t>활용 </a:t>
+            </a:r>
+            <a:r>
+              <a:rPr lang="en-US" altLang="ko-KR" dirty="0"/>
+              <a:t>-&gt; </a:t>
+            </a:r>
+            <a:r>
+              <a:rPr lang="ko-KR" altLang="en-US" dirty="0"/>
+              <a:t>특수차량</a:t>
+            </a:r>
+            <a:r>
+              <a:rPr lang="en-US" altLang="ko-KR" dirty="0"/>
+              <a:t>, </a:t>
+            </a:r>
+            <a:r>
+              <a:rPr lang="en-US" altLang="ko-KR" dirty="0" err="1"/>
+              <a:t>vip</a:t>
+            </a:r>
+            <a:r>
+              <a:rPr lang="ko-KR" altLang="en-US" dirty="0"/>
+              <a:t>호송 등등</a:t>
+            </a:r>
+            <a:endParaRPr lang="en-US" altLang="ko-KR" dirty="0"/>
+          </a:p>
+          <a:p>
+            <a:endParaRPr lang="ko-KR" altLang="en-US" dirty="0"/>
+          </a:p>
+        </p:txBody>
+      </p:sp>
+    </p:spTree>
+    <p:extLst>
+      <p:ext uri="{BB962C8B-B14F-4D97-AF65-F5344CB8AC3E}">
+        <p14:creationId xmlns:p14="http://schemas.microsoft.com/office/powerpoint/2010/main" val="3800118700"/>
+      </p:ext>
+    </p:extLst>
+  </p:cSld>
+  <p:clrMapOvr>
+    <a:masterClrMapping/>
+  </p:clrMapOvr>
+</p:sld>
+</file>
+
+<file path=ppt/slides/slide13.xml><?xml version="1.0" encoding="utf-8"?>
+<p:sld xmlns:a="http://schemas.openxmlformats.org/drawingml/2006/main" xmlns:r="http://schemas.openxmlformats.org/officeDocument/2006/relationships" xmlns:p="http://schemas.openxmlformats.org/presentationml/2006/main">
+  <p:cSld>
+    <p:spTree>
+      <p:nvGrpSpPr>
+        <p:cNvPr id="1" name=""/>
+        <p:cNvGrpSpPr/>
+        <p:nvPr/>
+      </p:nvGrpSpPr>
+      <p:grpSpPr>
+        <a:xfrm>
+          <a:off x="0" y="0"/>
+          <a:ext cx="0" cy="0"/>
+          <a:chOff x="0" y="0"/>
+          <a:chExt cx="0" cy="0"/>
+        </a:xfrm>
+      </p:grpSpPr>
+      <p:sp>
+        <p:nvSpPr>
+          <p:cNvPr id="2" name="제목 1">
+            <a:extLst>
+              <a:ext uri="{FF2B5EF4-FFF2-40B4-BE49-F238E27FC236}">
+                <a16:creationId xmlns:a16="http://schemas.microsoft.com/office/drawing/2014/main" id="{0423823E-CA6D-0DFA-4403-A7FC715FD5E2}"/>
+              </a:ext>
+            </a:extLst>
+          </p:cNvPr>
+          <p:cNvSpPr>
+            <a:spLocks noGrp="1"/>
+          </p:cNvSpPr>
+          <p:nvPr>
+            <p:ph type="title"/>
+          </p:nvPr>
+        </p:nvSpPr>
+        <p:spPr>
+          <a:xfrm>
+            <a:off x="457200" y="177864"/>
+            <a:ext cx="10515600" cy="1325563"/>
+          </a:xfrm>
+        </p:spPr>
+        <p:txBody>
+          <a:bodyPr/>
+          <a:lstStyle/>
+          <a:p>
+            <a:r>
+              <a:rPr lang="ko-KR" altLang="en-US">
+                <a:solidFill>
+                  <a:srgbClr val="3679A4"/>
+                </a:solidFill>
+                <a:latin typeface="에스코어 드림 9 Black" panose="020B0A03030302020204" pitchFamily="34" charset="-127"/>
+                <a:ea typeface="에스코어 드림 9 Black" panose="020B0A03030302020204" pitchFamily="34" charset="-127"/>
+              </a:rPr>
+              <a:t>현실적 </a:t>
+            </a:r>
+            <a:r>
+              <a:rPr lang="ko-KR" altLang="en-US" dirty="0">
+                <a:solidFill>
+                  <a:srgbClr val="F56D6D"/>
+                </a:solidFill>
+                <a:latin typeface="에스코어 드림 9 Black" panose="020B0A03030302020204" pitchFamily="34" charset="-127"/>
+                <a:ea typeface="에스코어 드림 9 Black" panose="020B0A03030302020204" pitchFamily="34" charset="-127"/>
+              </a:rPr>
+              <a:t>제한요소</a:t>
+            </a:r>
+          </a:p>
+        </p:txBody>
+      </p:sp>
+    </p:spTree>
+    <p:extLst>
+      <p:ext uri="{BB962C8B-B14F-4D97-AF65-F5344CB8AC3E}">
+        <p14:creationId xmlns:p14="http://schemas.microsoft.com/office/powerpoint/2010/main" val="1361816530"/>
+      </p:ext>
+    </p:extLst>
+  </p:cSld>
+  <p:clrMapOvr>
+    <a:masterClrMapping/>
+  </p:clrMapOvr>
+</p:sld>
+</file>
+
 <file path=ppt/slides/slide2.xml><?xml version="1.0" encoding="utf-8"?>
 <p:sld xmlns:a="http://schemas.openxmlformats.org/drawingml/2006/main" xmlns:r="http://schemas.openxmlformats.org/officeDocument/2006/relationships" xmlns:p="http://schemas.openxmlformats.org/presentationml/2006/main">
   <p:cSld>
@@ -5970,6 +8808,145 @@
           </a:p>
         </p:txBody>
       </p:sp>
+      <p:sp>
+        <p:nvSpPr>
+          <p:cNvPr id="3" name="TextBox 2">
+            <a:extLst>
+              <a:ext uri="{FF2B5EF4-FFF2-40B4-BE49-F238E27FC236}">
+                <a16:creationId xmlns:a16="http://schemas.microsoft.com/office/drawing/2014/main" id="{02322902-D6CE-121C-6A92-AA34FC663DB2}"/>
+              </a:ext>
+            </a:extLst>
+          </p:cNvPr>
+          <p:cNvSpPr txBox="1"/>
+          <p:nvPr/>
+        </p:nvSpPr>
+        <p:spPr>
+          <a:xfrm>
+            <a:off x="3254604" y="1992983"/>
+            <a:ext cx="4920792" cy="1323439"/>
+          </a:xfrm>
+          <a:prstGeom prst="rect">
+            <a:avLst/>
+          </a:prstGeom>
+          <a:noFill/>
+        </p:spPr>
+        <p:txBody>
+          <a:bodyPr wrap="square" rtlCol="0">
+            <a:spAutoFit/>
+          </a:bodyPr>
+          <a:lstStyle/>
+          <a:p>
+            <a:pPr algn="ctr"/>
+            <a:r>
+              <a:rPr lang="ko-KR" altLang="en-US" sz="4000" dirty="0">
+                <a:latin typeface="에스코어 드림 4 Regular" panose="020B0503030302020204" pitchFamily="34" charset="-127"/>
+                <a:ea typeface="에스코어 드림 4 Regular" panose="020B0503030302020204" pitchFamily="34" charset="-127"/>
+              </a:rPr>
+              <a:t>긴급 차량 지원</a:t>
+            </a:r>
+            <a:endParaRPr lang="en-US" altLang="ko-KR" sz="4000" dirty="0">
+              <a:latin typeface="에스코어 드림 4 Regular" panose="020B0503030302020204" pitchFamily="34" charset="-127"/>
+              <a:ea typeface="에스코어 드림 4 Regular" panose="020B0503030302020204" pitchFamily="34" charset="-127"/>
+            </a:endParaRPr>
+          </a:p>
+          <a:p>
+            <a:pPr algn="ctr"/>
+            <a:r>
+              <a:rPr lang="ko-KR" altLang="en-US" sz="4000" dirty="0">
+                <a:latin typeface="에스코어 드림 4 Regular" panose="020B0503030302020204" pitchFamily="34" charset="-127"/>
+                <a:ea typeface="에스코어 드림 4 Regular" panose="020B0503030302020204" pitchFamily="34" charset="-127"/>
+              </a:rPr>
+              <a:t>교통 통제</a:t>
+            </a:r>
+          </a:p>
+        </p:txBody>
+      </p:sp>
+      <p:cxnSp>
+        <p:nvCxnSpPr>
+          <p:cNvPr id="5" name="직선 화살표 연결선 4">
+            <a:extLst>
+              <a:ext uri="{FF2B5EF4-FFF2-40B4-BE49-F238E27FC236}">
+                <a16:creationId xmlns:a16="http://schemas.microsoft.com/office/drawing/2014/main" id="{C894D78A-62DE-5C98-6A17-2C0F1B1285EC}"/>
+              </a:ext>
+            </a:extLst>
+          </p:cNvPr>
+          <p:cNvCxnSpPr>
+            <a:cxnSpLocks/>
+          </p:cNvCxnSpPr>
+          <p:nvPr/>
+        </p:nvCxnSpPr>
+        <p:spPr>
+          <a:xfrm>
+            <a:off x="5715000" y="3392622"/>
+            <a:ext cx="0" cy="1108677"/>
+          </a:xfrm>
+          <a:prstGeom prst="straightConnector1">
+            <a:avLst/>
+          </a:prstGeom>
+          <a:ln w="190500">
+            <a:solidFill>
+              <a:srgbClr val="0070C0"/>
+            </a:solidFill>
+            <a:tailEnd type="triangle"/>
+          </a:ln>
+        </p:spPr>
+        <p:style>
+          <a:lnRef idx="1">
+            <a:schemeClr val="accent1"/>
+          </a:lnRef>
+          <a:fillRef idx="0">
+            <a:schemeClr val="accent1"/>
+          </a:fillRef>
+          <a:effectRef idx="0">
+            <a:schemeClr val="accent1"/>
+          </a:effectRef>
+          <a:fontRef idx="minor">
+            <a:schemeClr val="tx1"/>
+          </a:fontRef>
+        </p:style>
+      </p:cxnSp>
+      <p:sp>
+        <p:nvSpPr>
+          <p:cNvPr id="7" name="TextBox 6">
+            <a:extLst>
+              <a:ext uri="{FF2B5EF4-FFF2-40B4-BE49-F238E27FC236}">
+                <a16:creationId xmlns:a16="http://schemas.microsoft.com/office/drawing/2014/main" id="{85023DE6-30CC-FDBD-8FA1-3C6E29F553C2}"/>
+              </a:ext>
+            </a:extLst>
+          </p:cNvPr>
+          <p:cNvSpPr txBox="1"/>
+          <p:nvPr/>
+        </p:nvSpPr>
+        <p:spPr>
+          <a:xfrm>
+            <a:off x="2600325" y="5048250"/>
+            <a:ext cx="6362700" cy="707886"/>
+          </a:xfrm>
+          <a:prstGeom prst="rect">
+            <a:avLst/>
+          </a:prstGeom>
+          <a:noFill/>
+        </p:spPr>
+        <p:txBody>
+          <a:bodyPr wrap="square" rtlCol="0">
+            <a:spAutoFit/>
+          </a:bodyPr>
+          <a:lstStyle/>
+          <a:p>
+            <a:pPr algn="ctr"/>
+            <a:r>
+              <a:rPr lang="ko-KR" altLang="en-US" sz="4000" dirty="0">
+                <a:solidFill>
+                  <a:srgbClr val="FF0000"/>
+                </a:solidFill>
+                <a:latin typeface="에스코어 드림 5 Medium" panose="020B0503030302020204" pitchFamily="34" charset="-127"/>
+                <a:ea typeface="에스코어 드림 5 Medium" panose="020B0503030302020204" pitchFamily="34" charset="-127"/>
+              </a:rPr>
+              <a:t>골든 타임 내 도착</a:t>
+            </a:r>
+          </a:p>
+        </p:txBody>
+      </p:sp>
     </p:spTree>
     <p:extLst>
       <p:ext uri="{BB962C8B-B14F-4D97-AF65-F5344CB8AC3E}">
@@ -6029,22 +9006,22 @@
             <a:r>
               <a:rPr lang="ko-KR" altLang="en-US" dirty="0">
                 <a:solidFill>
+                  <a:srgbClr val="F56D6D"/>
+                </a:solidFill>
+                <a:latin typeface="에스코어 드림 9 Black" panose="020B0A03030302020204" pitchFamily="34" charset="-127"/>
+                <a:ea typeface="에스코어 드림 9 Black" panose="020B0A03030302020204" pitchFamily="34" charset="-127"/>
+              </a:rPr>
+              <a:t>기업</a:t>
+            </a:r>
+            <a:r>
+              <a:rPr lang="ko-KR" altLang="en-US" dirty="0">
+                <a:solidFill>
                   <a:srgbClr val="3679A4"/>
                 </a:solidFill>
                 <a:latin typeface="에스코어 드림 9 Black" panose="020B0A03030302020204" pitchFamily="34" charset="-127"/>
                 <a:ea typeface="에스코어 드림 9 Black" panose="020B0A03030302020204" pitchFamily="34" charset="-127"/>
               </a:rPr>
-              <a:t>기업 </a:t>
-            </a:r>
-            <a:r>
-              <a:rPr lang="ko-KR" altLang="en-US" dirty="0">
-                <a:solidFill>
-                  <a:srgbClr val="F56D6D"/>
-                </a:solidFill>
-                <a:latin typeface="에스코어 드림 9 Black" panose="020B0A03030302020204" pitchFamily="34" charset="-127"/>
-                <a:ea typeface="에스코어 드림 9 Black" panose="020B0A03030302020204" pitchFamily="34" charset="-127"/>
-              </a:rPr>
-              <a:t>요구도</a:t>
+              <a:t> 요구도</a:t>
             </a:r>
           </a:p>
         </p:txBody>
@@ -6128,6 +9105,268 @@
           </a:p>
         </p:txBody>
       </p:sp>
+      <p:sp>
+        <p:nvSpPr>
+          <p:cNvPr id="6" name="직사각형 5">
+            <a:extLst>
+              <a:ext uri="{FF2B5EF4-FFF2-40B4-BE49-F238E27FC236}">
+                <a16:creationId xmlns:a16="http://schemas.microsoft.com/office/drawing/2014/main" id="{AE9A62FD-71BD-5056-6552-99A718A97C98}"/>
+              </a:ext>
+            </a:extLst>
+          </p:cNvPr>
+          <p:cNvSpPr/>
+          <p:nvPr/>
+        </p:nvSpPr>
+        <p:spPr>
+          <a:xfrm>
+            <a:off x="6807740" y="1226436"/>
+            <a:ext cx="5009745" cy="1220318"/>
+          </a:xfrm>
+          <a:prstGeom prst="rect">
+            <a:avLst/>
+          </a:prstGeom>
+          <a:solidFill>
+            <a:srgbClr val="EEEEEE"/>
+          </a:solidFill>
+          <a:ln>
+            <a:noFill/>
+          </a:ln>
+        </p:spPr>
+        <p:style>
+          <a:lnRef idx="2">
+            <a:schemeClr val="accent1">
+              <a:shade val="50000"/>
+            </a:schemeClr>
+          </a:lnRef>
+          <a:fillRef idx="1">
+            <a:schemeClr val="accent1"/>
+          </a:fillRef>
+          <a:effectRef idx="0">
+            <a:schemeClr val="accent1"/>
+          </a:effectRef>
+          <a:fontRef idx="minor">
+            <a:schemeClr val="lt1"/>
+          </a:fontRef>
+        </p:style>
+        <p:txBody>
+          <a:bodyPr rtlCol="0" anchor="ctr"/>
+          <a:lstStyle/>
+          <a:p>
+            <a:pPr algn="ctr"/>
+            <a:r>
+              <a:rPr lang="ko-KR" altLang="en-US" dirty="0">
+                <a:solidFill>
+                  <a:schemeClr val="tx1"/>
+                </a:solidFill>
+                <a:latin typeface="에스코어 드림 4 Regular" panose="020B0503030302020204" pitchFamily="34" charset="-127"/>
+                <a:ea typeface="에스코어 드림 4 Regular" panose="020B0503030302020204" pitchFamily="34" charset="-127"/>
+              </a:rPr>
+              <a:t>차량과 거리를 유지하며 전방에서 비행</a:t>
+            </a:r>
+          </a:p>
+        </p:txBody>
+      </p:sp>
+      <p:sp>
+        <p:nvSpPr>
+          <p:cNvPr id="8" name="직사각형 7">
+            <a:extLst>
+              <a:ext uri="{FF2B5EF4-FFF2-40B4-BE49-F238E27FC236}">
+                <a16:creationId xmlns:a16="http://schemas.microsoft.com/office/drawing/2014/main" id="{8D94C876-3D24-9A41-5BD4-52B1DE5EB146}"/>
+              </a:ext>
+            </a:extLst>
+          </p:cNvPr>
+          <p:cNvSpPr/>
+          <p:nvPr/>
+        </p:nvSpPr>
+        <p:spPr>
+          <a:xfrm>
+            <a:off x="6807740" y="2872247"/>
+            <a:ext cx="5009745" cy="1220318"/>
+          </a:xfrm>
+          <a:prstGeom prst="rect">
+            <a:avLst/>
+          </a:prstGeom>
+          <a:solidFill>
+            <a:srgbClr val="EEEEEE"/>
+          </a:solidFill>
+          <a:ln>
+            <a:noFill/>
+          </a:ln>
+        </p:spPr>
+        <p:style>
+          <a:lnRef idx="2">
+            <a:schemeClr val="accent1">
+              <a:shade val="50000"/>
+            </a:schemeClr>
+          </a:lnRef>
+          <a:fillRef idx="1">
+            <a:schemeClr val="accent1"/>
+          </a:fillRef>
+          <a:effectRef idx="0">
+            <a:schemeClr val="accent1"/>
+          </a:effectRef>
+          <a:fontRef idx="minor">
+            <a:schemeClr val="lt1"/>
+          </a:fontRef>
+        </p:style>
+        <p:txBody>
+          <a:bodyPr rtlCol="0" anchor="ctr"/>
+          <a:lstStyle/>
+          <a:p>
+            <a:pPr algn="ctr"/>
+            <a:r>
+              <a:rPr lang="ko-KR" altLang="en-US" dirty="0">
+                <a:solidFill>
+                  <a:schemeClr val="tx1"/>
+                </a:solidFill>
+                <a:latin typeface="에스코어 드림 4 Regular" panose="020B0503030302020204" pitchFamily="34" charset="-127"/>
+                <a:ea typeface="에스코어 드림 4 Regular" panose="020B0503030302020204" pitchFamily="34" charset="-127"/>
+              </a:rPr>
+              <a:t>교차로와 횡단보도에서 </a:t>
+            </a:r>
+            <a:r>
+              <a:rPr lang="ko-KR" altLang="en-US" dirty="0" err="1">
+                <a:solidFill>
+                  <a:schemeClr val="tx1"/>
+                </a:solidFill>
+                <a:latin typeface="에스코어 드림 4 Regular" panose="020B0503030302020204" pitchFamily="34" charset="-127"/>
+                <a:ea typeface="에스코어 드림 4 Regular" panose="020B0503030302020204" pitchFamily="34" charset="-127"/>
+              </a:rPr>
+              <a:t>호버링</a:t>
+            </a:r>
+            <a:r>
+              <a:rPr lang="ko-KR" altLang="en-US" dirty="0">
+                <a:solidFill>
+                  <a:schemeClr val="tx1"/>
+                </a:solidFill>
+                <a:latin typeface="에스코어 드림 4 Regular" panose="020B0503030302020204" pitchFamily="34" charset="-127"/>
+                <a:ea typeface="에스코어 드림 4 Regular" panose="020B0503030302020204" pitchFamily="34" charset="-127"/>
+              </a:rPr>
+              <a:t> 하며 차량 통제</a:t>
+            </a:r>
+          </a:p>
+        </p:txBody>
+      </p:sp>
+      <p:sp>
+        <p:nvSpPr>
+          <p:cNvPr id="10" name="직사각형 9">
+            <a:extLst>
+              <a:ext uri="{FF2B5EF4-FFF2-40B4-BE49-F238E27FC236}">
+                <a16:creationId xmlns:a16="http://schemas.microsoft.com/office/drawing/2014/main" id="{F9962305-EB59-C6F4-0B72-A6C60BE21EFB}"/>
+              </a:ext>
+            </a:extLst>
+          </p:cNvPr>
+          <p:cNvSpPr/>
+          <p:nvPr/>
+        </p:nvSpPr>
+        <p:spPr>
+          <a:xfrm>
+            <a:off x="6807740" y="4518058"/>
+            <a:ext cx="5009745" cy="1220318"/>
+          </a:xfrm>
+          <a:prstGeom prst="rect">
+            <a:avLst/>
+          </a:prstGeom>
+          <a:solidFill>
+            <a:srgbClr val="EEEEEE"/>
+          </a:solidFill>
+          <a:ln>
+            <a:noFill/>
+          </a:ln>
+        </p:spPr>
+        <p:style>
+          <a:lnRef idx="2">
+            <a:schemeClr val="accent1">
+              <a:shade val="50000"/>
+            </a:schemeClr>
+          </a:lnRef>
+          <a:fillRef idx="1">
+            <a:schemeClr val="accent1"/>
+          </a:fillRef>
+          <a:effectRef idx="0">
+            <a:schemeClr val="accent1"/>
+          </a:effectRef>
+          <a:fontRef idx="minor">
+            <a:schemeClr val="lt1"/>
+          </a:fontRef>
+        </p:style>
+        <p:txBody>
+          <a:bodyPr rtlCol="0" anchor="ctr"/>
+          <a:lstStyle/>
+          <a:p>
+            <a:pPr algn="ctr"/>
+            <a:r>
+              <a:rPr lang="ko-KR" altLang="en-US" dirty="0" err="1">
+                <a:solidFill>
+                  <a:schemeClr val="tx1"/>
+                </a:solidFill>
+                <a:latin typeface="에스코어 드림 4 Regular" panose="020B0503030302020204" pitchFamily="34" charset="-127"/>
+                <a:ea typeface="에스코어 드림 4 Regular" panose="020B0503030302020204" pitchFamily="34" charset="-127"/>
+              </a:rPr>
+              <a:t>정체시</a:t>
+            </a:r>
+            <a:r>
+              <a:rPr lang="ko-KR" altLang="en-US" dirty="0">
+                <a:solidFill>
+                  <a:schemeClr val="tx1"/>
+                </a:solidFill>
+                <a:latin typeface="에스코어 드림 4 Regular" panose="020B0503030302020204" pitchFamily="34" charset="-127"/>
+                <a:ea typeface="에스코어 드림 4 Regular" panose="020B0503030302020204" pitchFamily="34" charset="-127"/>
+              </a:rPr>
+              <a:t> 가장 가까운 교차로로 이동</a:t>
+            </a:r>
+          </a:p>
+        </p:txBody>
+      </p:sp>
+      <p:sp>
+        <p:nvSpPr>
+          <p:cNvPr id="13" name="직사각형 12">
+            <a:extLst>
+              <a:ext uri="{FF2B5EF4-FFF2-40B4-BE49-F238E27FC236}">
+                <a16:creationId xmlns:a16="http://schemas.microsoft.com/office/drawing/2014/main" id="{D0DE3768-61FC-3B2B-F785-3DC276B9B38E}"/>
+              </a:ext>
+            </a:extLst>
+          </p:cNvPr>
+          <p:cNvSpPr/>
+          <p:nvPr/>
+        </p:nvSpPr>
+        <p:spPr>
+          <a:xfrm>
+            <a:off x="982494" y="2237362"/>
+            <a:ext cx="4542817" cy="3336587"/>
+          </a:xfrm>
+          <a:prstGeom prst="rect">
+            <a:avLst/>
+          </a:prstGeom>
+        </p:spPr>
+        <p:style>
+          <a:lnRef idx="2">
+            <a:schemeClr val="accent1">
+              <a:shade val="50000"/>
+            </a:schemeClr>
+          </a:lnRef>
+          <a:fillRef idx="1">
+            <a:schemeClr val="accent1"/>
+          </a:fillRef>
+          <a:effectRef idx="0">
+            <a:schemeClr val="accent1"/>
+          </a:effectRef>
+          <a:fontRef idx="minor">
+            <a:schemeClr val="lt1"/>
+          </a:fontRef>
+        </p:style>
+        <p:txBody>
+          <a:bodyPr rtlCol="0" anchor="ctr"/>
+          <a:lstStyle/>
+          <a:p>
+            <a:pPr algn="ctr"/>
+            <a:r>
+              <a:rPr lang="ko-KR" altLang="en-US" dirty="0"/>
+              <a:t>동영상</a:t>
+            </a:r>
+          </a:p>
+        </p:txBody>
+      </p:sp>
     </p:spTree>
     <p:extLst>
       <p:ext uri="{BB962C8B-B14F-4D97-AF65-F5344CB8AC3E}">
@@ -6187,27 +9426,69 @@
             <a:r>
               <a:rPr lang="ko-KR" altLang="en-US" dirty="0">
                 <a:solidFill>
+                  <a:srgbClr val="F56D6D"/>
+                </a:solidFill>
+                <a:latin typeface="에스코어 드림 9 Black" panose="020B0A03030302020204" pitchFamily="34" charset="-127"/>
+                <a:ea typeface="에스코어 드림 9 Black" panose="020B0A03030302020204" pitchFamily="34" charset="-127"/>
+              </a:rPr>
+              <a:t>개발</a:t>
+            </a:r>
+            <a:r>
+              <a:rPr lang="ko-KR" altLang="en-US" dirty="0">
+                <a:solidFill>
                   <a:srgbClr val="3679A4"/>
                 </a:solidFill>
                 <a:latin typeface="에스코어 드림 9 Black" panose="020B0A03030302020204" pitchFamily="34" charset="-127"/>
                 <a:ea typeface="에스코어 드림 9 Black" panose="020B0A03030302020204" pitchFamily="34" charset="-127"/>
               </a:rPr>
-              <a:t>결과물</a:t>
-            </a:r>
-            <a:endParaRPr lang="ko-KR" altLang="en-US" dirty="0">
-              <a:solidFill>
-                <a:srgbClr val="F56D6D"/>
-              </a:solidFill>
-              <a:latin typeface="에스코어 드림 9 Black" panose="020B0A03030302020204" pitchFamily="34" charset="-127"/>
-              <a:ea typeface="에스코어 드림 9 Black" panose="020B0A03030302020204" pitchFamily="34" charset="-127"/>
-            </a:endParaRPr>
-          </a:p>
-        </p:txBody>
-      </p:sp>
+              <a:t> 내용</a:t>
+            </a:r>
+          </a:p>
+        </p:txBody>
+      </p:sp>
+      <p:pic>
+        <p:nvPicPr>
+          <p:cNvPr id="4" name="Picture 2">
+            <a:extLst>
+              <a:ext uri="{FF2B5EF4-FFF2-40B4-BE49-F238E27FC236}">
+                <a16:creationId xmlns:a16="http://schemas.microsoft.com/office/drawing/2014/main" id="{0FBD1C01-D534-F534-25C4-899E8F466E08}"/>
+              </a:ext>
+            </a:extLst>
+          </p:cNvPr>
+          <p:cNvPicPr>
+            <a:picLocks noChangeAspect="1"/>
+          </p:cNvPicPr>
+          <p:nvPr/>
+        </p:nvPicPr>
+        <p:blipFill>
+          <a:blip r:embed="rId3"/>
+          <a:stretch>
+            <a:fillRect/>
+          </a:stretch>
+        </p:blipFill>
+        <p:spPr>
+          <a:xfrm>
+            <a:off x="975129" y="1750797"/>
+            <a:ext cx="10241742" cy="3880909"/>
+          </a:xfrm>
+          <a:prstGeom prst="rect">
+            <a:avLst/>
+          </a:prstGeom>
+          <a:noFill/>
+          <a:ln w="9525" cap="rnd">
+            <a:solidFill>
+              <a:srgbClr val="000000"/>
+            </a:solidFill>
+            <a:prstDash val="solid"/>
+            <a:miter/>
+          </a:ln>
+          <a:effectLst/>
+        </p:spPr>
+      </p:pic>
     </p:spTree>
     <p:extLst>
       <p:ext uri="{BB962C8B-B14F-4D97-AF65-F5344CB8AC3E}">
-        <p14:creationId xmlns:p14="http://schemas.microsoft.com/office/powerpoint/2010/main" val="4248988520"/>
+        <p14:creationId xmlns:p14="http://schemas.microsoft.com/office/powerpoint/2010/main" val="101114485"/>
       </p:ext>
     </p:extLst>
   </p:cSld>
@@ -6268,7 +9549,7 @@
                 <a:latin typeface="에스코어 드림 9 Black" panose="020B0A03030302020204" pitchFamily="34" charset="-127"/>
                 <a:ea typeface="에스코어 드림 9 Black" panose="020B0A03030302020204" pitchFamily="34" charset="-127"/>
               </a:rPr>
-              <a:t>기대 </a:t>
+              <a:t>개발 </a:t>
             </a:r>
             <a:r>
               <a:rPr lang="ko-KR" altLang="en-US" dirty="0">
@@ -6278,15 +9559,54 @@
                 <a:latin typeface="에스코어 드림 9 Black" panose="020B0A03030302020204" pitchFamily="34" charset="-127"/>
                 <a:ea typeface="에스코어 드림 9 Black" panose="020B0A03030302020204" pitchFamily="34" charset="-127"/>
               </a:rPr>
-              <a:t>효과</a:t>
-            </a:r>
-          </a:p>
-        </p:txBody>
-      </p:sp>
+              <a:t>내용</a:t>
+            </a:r>
+          </a:p>
+        </p:txBody>
+      </p:sp>
+      <p:pic>
+        <p:nvPicPr>
+          <p:cNvPr id="3" name="Picture 0">
+            <a:extLst>
+              <a:ext uri="{FF2B5EF4-FFF2-40B4-BE49-F238E27FC236}">
+                <a16:creationId xmlns:a16="http://schemas.microsoft.com/office/drawing/2014/main" id="{1ECE6C5E-11B4-0478-1B50-A305090EF690}"/>
+              </a:ext>
+            </a:extLst>
+          </p:cNvPr>
+          <p:cNvPicPr>
+            <a:picLocks noChangeAspect="1"/>
+          </p:cNvPicPr>
+          <p:nvPr/>
+        </p:nvPicPr>
+        <p:blipFill>
+          <a:blip r:embed="rId3"/>
+          <a:stretch>
+            <a:fillRect/>
+          </a:stretch>
+        </p:blipFill>
+        <p:spPr>
+          <a:xfrm>
+            <a:off x="1797344" y="1428011"/>
+            <a:ext cx="8540750" cy="4996472"/>
+          </a:xfrm>
+          <a:prstGeom prst="rect">
+            <a:avLst/>
+          </a:prstGeom>
+          <a:noFill/>
+          <a:ln w="9525" cap="rnd">
+            <a:solidFill>
+              <a:srgbClr val="000000"/>
+            </a:solidFill>
+            <a:prstDash val="solid"/>
+            <a:miter/>
+          </a:ln>
+          <a:effectLst/>
+        </p:spPr>
+      </p:pic>
     </p:spTree>
     <p:extLst>
       <p:ext uri="{BB962C8B-B14F-4D97-AF65-F5344CB8AC3E}">
-        <p14:creationId xmlns:p14="http://schemas.microsoft.com/office/powerpoint/2010/main" val="3800118700"/>
+        <p14:creationId xmlns:p14="http://schemas.microsoft.com/office/powerpoint/2010/main" val="3415972706"/>
       </p:ext>
     </p:extLst>
   </p:cSld>

</xml_diff>